<commit_message>
update figures in manu.
</commit_message>
<xml_diff>
--- a/plot_fig/sup_figures/sup_fig_results/DNN model.pptx
+++ b/plot_fig/sup_figures/sup_fig_results/DNN model.pptx
@@ -169,6 +169,718 @@
     </pc:docChg>
   </pc:docChgLst>
   <pc:docChgLst>
+    <pc:chgData name="XIONG Xin" userId="5005eae9-336c-4714-96df-1c1bef3d405b" providerId="ADAL" clId="{7517026C-8CF6-C54D-BD06-35289FFC2D04}"/>
+    <pc:docChg chg="custSel addSld modSld">
+      <pc:chgData name="XIONG Xin" userId="5005eae9-336c-4714-96df-1c1bef3d405b" providerId="ADAL" clId="{7517026C-8CF6-C54D-BD06-35289FFC2D04}" dt="2023-03-28T13:25:42.303" v="121" actId="1076"/>
+      <pc:docMkLst>
+        <pc:docMk/>
+      </pc:docMkLst>
+      <pc:sldChg chg="delSp modSp add mod">
+        <pc:chgData name="XIONG Xin" userId="5005eae9-336c-4714-96df-1c1bef3d405b" providerId="ADAL" clId="{7517026C-8CF6-C54D-BD06-35289FFC2D04}" dt="2023-03-28T13:25:42.303" v="121" actId="1076"/>
+        <pc:sldMkLst>
+          <pc:docMk/>
+          <pc:sldMk cId="1775599074" sldId="272"/>
+        </pc:sldMkLst>
+        <pc:spChg chg="mod">
+          <ac:chgData name="XIONG Xin" userId="5005eae9-336c-4714-96df-1c1bef3d405b" providerId="ADAL" clId="{7517026C-8CF6-C54D-BD06-35289FFC2D04}" dt="2023-03-28T13:06:14.691" v="52" actId="1076"/>
+          <ac:spMkLst>
+            <pc:docMk/>
+            <pc:sldMk cId="1775599074" sldId="272"/>
+            <ac:spMk id="5" creationId="{32889513-EC9E-477F-9F3D-42850493D2FF}"/>
+          </ac:spMkLst>
+        </pc:spChg>
+        <pc:spChg chg="mod">
+          <ac:chgData name="XIONG Xin" userId="5005eae9-336c-4714-96df-1c1bef3d405b" providerId="ADAL" clId="{7517026C-8CF6-C54D-BD06-35289FFC2D04}" dt="2023-03-28T13:03:34.181" v="32" actId="1076"/>
+          <ac:spMkLst>
+            <pc:docMk/>
+            <pc:sldMk cId="1775599074" sldId="272"/>
+            <ac:spMk id="6" creationId="{D0B62F09-24B3-46E4-BD95-873F0F398FEF}"/>
+          </ac:spMkLst>
+        </pc:spChg>
+        <pc:spChg chg="mod">
+          <ac:chgData name="XIONG Xin" userId="5005eae9-336c-4714-96df-1c1bef3d405b" providerId="ADAL" clId="{7517026C-8CF6-C54D-BD06-35289FFC2D04}" dt="2023-03-28T13:05:41.888" v="49" actId="1037"/>
+          <ac:spMkLst>
+            <pc:docMk/>
+            <pc:sldMk cId="1775599074" sldId="272"/>
+            <ac:spMk id="8" creationId="{692BA9B7-DBA1-4B03-8017-9CCFD79C9200}"/>
+          </ac:spMkLst>
+        </pc:spChg>
+        <pc:spChg chg="mod">
+          <ac:chgData name="XIONG Xin" userId="5005eae9-336c-4714-96df-1c1bef3d405b" providerId="ADAL" clId="{7517026C-8CF6-C54D-BD06-35289FFC2D04}" dt="2023-03-28T13:05:36.789" v="48" actId="1037"/>
+          <ac:spMkLst>
+            <pc:docMk/>
+            <pc:sldMk cId="1775599074" sldId="272"/>
+            <ac:spMk id="9" creationId="{9B1B1EA1-194D-4285-B89D-A71A59B17781}"/>
+          </ac:spMkLst>
+        </pc:spChg>
+        <pc:spChg chg="mod">
+          <ac:chgData name="XIONG Xin" userId="5005eae9-336c-4714-96df-1c1bef3d405b" providerId="ADAL" clId="{7517026C-8CF6-C54D-BD06-35289FFC2D04}" dt="2023-03-28T13:15:30.170" v="93" actId="1037"/>
+          <ac:spMkLst>
+            <pc:docMk/>
+            <pc:sldMk cId="1775599074" sldId="272"/>
+            <ac:spMk id="11" creationId="{A9A6ABCE-8F99-4B94-9352-F1858D5D0BF2}"/>
+          </ac:spMkLst>
+        </pc:spChg>
+        <pc:spChg chg="mod">
+          <ac:chgData name="XIONG Xin" userId="5005eae9-336c-4714-96df-1c1bef3d405b" providerId="ADAL" clId="{7517026C-8CF6-C54D-BD06-35289FFC2D04}" dt="2023-03-28T13:03:34.181" v="32" actId="1076"/>
+          <ac:spMkLst>
+            <pc:docMk/>
+            <pc:sldMk cId="1775599074" sldId="272"/>
+            <ac:spMk id="12" creationId="{B1C3650E-72C8-4DA1-B8CE-5802BAAE0607}"/>
+          </ac:spMkLst>
+        </pc:spChg>
+        <pc:spChg chg="mod">
+          <ac:chgData name="XIONG Xin" userId="5005eae9-336c-4714-96df-1c1bef3d405b" providerId="ADAL" clId="{7517026C-8CF6-C54D-BD06-35289FFC2D04}" dt="2023-03-28T13:03:26.171" v="31" actId="1076"/>
+          <ac:spMkLst>
+            <pc:docMk/>
+            <pc:sldMk cId="1775599074" sldId="272"/>
+            <ac:spMk id="13" creationId="{9491EB98-F89B-4B44-AEC0-E5CD72B75861}"/>
+          </ac:spMkLst>
+        </pc:spChg>
+        <pc:spChg chg="mod">
+          <ac:chgData name="XIONG Xin" userId="5005eae9-336c-4714-96df-1c1bef3d405b" providerId="ADAL" clId="{7517026C-8CF6-C54D-BD06-35289FFC2D04}" dt="2023-03-28T13:03:26.171" v="31" actId="1076"/>
+          <ac:spMkLst>
+            <pc:docMk/>
+            <pc:sldMk cId="1775599074" sldId="272"/>
+            <ac:spMk id="15" creationId="{03DBE21B-2CDA-42F3-A189-30B0C1C4C2CB}"/>
+          </ac:spMkLst>
+        </pc:spChg>
+        <pc:spChg chg="mod">
+          <ac:chgData name="XIONG Xin" userId="5005eae9-336c-4714-96df-1c1bef3d405b" providerId="ADAL" clId="{7517026C-8CF6-C54D-BD06-35289FFC2D04}" dt="2023-03-28T13:03:26.171" v="31" actId="1076"/>
+          <ac:spMkLst>
+            <pc:docMk/>
+            <pc:sldMk cId="1775599074" sldId="272"/>
+            <ac:spMk id="17" creationId="{E7BE5D92-7D20-4EF7-90D3-C6544B8ABE60}"/>
+          </ac:spMkLst>
+        </pc:spChg>
+        <pc:spChg chg="mod">
+          <ac:chgData name="XIONG Xin" userId="5005eae9-336c-4714-96df-1c1bef3d405b" providerId="ADAL" clId="{7517026C-8CF6-C54D-BD06-35289FFC2D04}" dt="2023-03-28T12:59:18.079" v="11" actId="1076"/>
+          <ac:spMkLst>
+            <pc:docMk/>
+            <pc:sldMk cId="1775599074" sldId="272"/>
+            <ac:spMk id="18" creationId="{594643AC-EA3E-4043-9605-EC24804F8023}"/>
+          </ac:spMkLst>
+        </pc:spChg>
+        <pc:spChg chg="mod">
+          <ac:chgData name="XIONG Xin" userId="5005eae9-336c-4714-96df-1c1bef3d405b" providerId="ADAL" clId="{7517026C-8CF6-C54D-BD06-35289FFC2D04}" dt="2023-03-28T12:59:18.079" v="11" actId="1076"/>
+          <ac:spMkLst>
+            <pc:docMk/>
+            <pc:sldMk cId="1775599074" sldId="272"/>
+            <ac:spMk id="19" creationId="{04B95AD8-3E0A-4BF6-A4F5-C01D0A16AF1D}"/>
+          </ac:spMkLst>
+        </pc:spChg>
+        <pc:spChg chg="mod">
+          <ac:chgData name="XIONG Xin" userId="5005eae9-336c-4714-96df-1c1bef3d405b" providerId="ADAL" clId="{7517026C-8CF6-C54D-BD06-35289FFC2D04}" dt="2023-03-28T12:59:18.079" v="11" actId="1076"/>
+          <ac:spMkLst>
+            <pc:docMk/>
+            <pc:sldMk cId="1775599074" sldId="272"/>
+            <ac:spMk id="20" creationId="{F430D4D2-4574-49AE-BA5C-B0F8749EDC54}"/>
+          </ac:spMkLst>
+        </pc:spChg>
+        <pc:spChg chg="del">
+          <ac:chgData name="XIONG Xin" userId="5005eae9-336c-4714-96df-1c1bef3d405b" providerId="ADAL" clId="{7517026C-8CF6-C54D-BD06-35289FFC2D04}" dt="2023-03-28T12:58:55.900" v="10" actId="478"/>
+          <ac:spMkLst>
+            <pc:docMk/>
+            <pc:sldMk cId="1775599074" sldId="272"/>
+            <ac:spMk id="21" creationId="{84F53A0B-12F6-4AE1-B7D5-A5F98940778E}"/>
+          </ac:spMkLst>
+        </pc:spChg>
+        <pc:spChg chg="del">
+          <ac:chgData name="XIONG Xin" userId="5005eae9-336c-4714-96df-1c1bef3d405b" providerId="ADAL" clId="{7517026C-8CF6-C54D-BD06-35289FFC2D04}" dt="2023-03-28T12:58:55.900" v="10" actId="478"/>
+          <ac:spMkLst>
+            <pc:docMk/>
+            <pc:sldMk cId="1775599074" sldId="272"/>
+            <ac:spMk id="23" creationId="{102D27A5-EAFC-45C5-992C-8E8944B49DDB}"/>
+          </ac:spMkLst>
+        </pc:spChg>
+        <pc:spChg chg="del">
+          <ac:chgData name="XIONG Xin" userId="5005eae9-336c-4714-96df-1c1bef3d405b" providerId="ADAL" clId="{7517026C-8CF6-C54D-BD06-35289FFC2D04}" dt="2023-03-28T12:58:55.900" v="10" actId="478"/>
+          <ac:spMkLst>
+            <pc:docMk/>
+            <pc:sldMk cId="1775599074" sldId="272"/>
+            <ac:spMk id="25" creationId="{403946AC-F032-408A-8DD5-C69DD4CF5F86}"/>
+          </ac:spMkLst>
+        </pc:spChg>
+        <pc:spChg chg="mod">
+          <ac:chgData name="XIONG Xin" userId="5005eae9-336c-4714-96df-1c1bef3d405b" providerId="ADAL" clId="{7517026C-8CF6-C54D-BD06-35289FFC2D04}" dt="2023-03-28T13:06:00.938" v="50" actId="1076"/>
+          <ac:spMkLst>
+            <pc:docMk/>
+            <pc:sldMk cId="1775599074" sldId="272"/>
+            <ac:spMk id="26" creationId="{F7956298-CBC5-4613-8803-AD900C6C25E8}"/>
+          </ac:spMkLst>
+        </pc:spChg>
+        <pc:spChg chg="mod">
+          <ac:chgData name="XIONG Xin" userId="5005eae9-336c-4714-96df-1c1bef3d405b" providerId="ADAL" clId="{7517026C-8CF6-C54D-BD06-35289FFC2D04}" dt="2023-03-28T13:06:00.938" v="50" actId="1076"/>
+          <ac:spMkLst>
+            <pc:docMk/>
+            <pc:sldMk cId="1775599074" sldId="272"/>
+            <ac:spMk id="27" creationId="{0C94B2AC-5586-4A3D-A189-1D178301C387}"/>
+          </ac:spMkLst>
+        </pc:spChg>
+        <pc:spChg chg="mod">
+          <ac:chgData name="XIONG Xin" userId="5005eae9-336c-4714-96df-1c1bef3d405b" providerId="ADAL" clId="{7517026C-8CF6-C54D-BD06-35289FFC2D04}" dt="2023-03-28T13:06:00.938" v="50" actId="1076"/>
+          <ac:spMkLst>
+            <pc:docMk/>
+            <pc:sldMk cId="1775599074" sldId="272"/>
+            <ac:spMk id="28" creationId="{187019E6-553B-456C-A632-F5BFB4F18E40}"/>
+          </ac:spMkLst>
+        </pc:spChg>
+        <pc:spChg chg="mod">
+          <ac:chgData name="XIONG Xin" userId="5005eae9-336c-4714-96df-1c1bef3d405b" providerId="ADAL" clId="{7517026C-8CF6-C54D-BD06-35289FFC2D04}" dt="2023-03-28T13:06:23.744" v="53" actId="1076"/>
+          <ac:spMkLst>
+            <pc:docMk/>
+            <pc:sldMk cId="1775599074" sldId="272"/>
+            <ac:spMk id="33" creationId="{654CEC44-76B0-480F-B2D5-AE1A78AB86D0}"/>
+          </ac:spMkLst>
+        </pc:spChg>
+        <pc:spChg chg="mod">
+          <ac:chgData name="XIONG Xin" userId="5005eae9-336c-4714-96df-1c1bef3d405b" providerId="ADAL" clId="{7517026C-8CF6-C54D-BD06-35289FFC2D04}" dt="2023-03-28T13:06:41.732" v="62" actId="1076"/>
+          <ac:spMkLst>
+            <pc:docMk/>
+            <pc:sldMk cId="1775599074" sldId="272"/>
+            <ac:spMk id="34" creationId="{6B619ABA-FBEC-4B29-BB7C-286A2E0629C6}"/>
+          </ac:spMkLst>
+        </pc:spChg>
+        <pc:spChg chg="mod">
+          <ac:chgData name="XIONG Xin" userId="5005eae9-336c-4714-96df-1c1bef3d405b" providerId="ADAL" clId="{7517026C-8CF6-C54D-BD06-35289FFC2D04}" dt="2023-03-28T13:07:59.005" v="85" actId="1076"/>
+          <ac:spMkLst>
+            <pc:docMk/>
+            <pc:sldMk cId="1775599074" sldId="272"/>
+            <ac:spMk id="36" creationId="{C125875B-5CC5-48FA-9350-DCE7B215F153}"/>
+          </ac:spMkLst>
+        </pc:spChg>
+        <pc:spChg chg="mod">
+          <ac:chgData name="XIONG Xin" userId="5005eae9-336c-4714-96df-1c1bef3d405b" providerId="ADAL" clId="{7517026C-8CF6-C54D-BD06-35289FFC2D04}" dt="2023-03-28T13:06:54.468" v="71" actId="1076"/>
+          <ac:spMkLst>
+            <pc:docMk/>
+            <pc:sldMk cId="1775599074" sldId="272"/>
+            <ac:spMk id="52" creationId="{54B0CDB6-ADF1-FC4F-D9F5-779BA0BA08FB}"/>
+          </ac:spMkLst>
+        </pc:spChg>
+        <pc:spChg chg="mod">
+          <ac:chgData name="XIONG Xin" userId="5005eae9-336c-4714-96df-1c1bef3d405b" providerId="ADAL" clId="{7517026C-8CF6-C54D-BD06-35289FFC2D04}" dt="2023-03-28T13:25:42.303" v="121" actId="1076"/>
+          <ac:spMkLst>
+            <pc:docMk/>
+            <pc:sldMk cId="1775599074" sldId="272"/>
+            <ac:spMk id="53" creationId="{515D8417-538F-9EB9-8312-7729998CDE3C}"/>
+          </ac:spMkLst>
+        </pc:spChg>
+        <pc:spChg chg="del">
+          <ac:chgData name="XIONG Xin" userId="5005eae9-336c-4714-96df-1c1bef3d405b" providerId="ADAL" clId="{7517026C-8CF6-C54D-BD06-35289FFC2D04}" dt="2023-03-28T12:58:55.900" v="10" actId="478"/>
+          <ac:spMkLst>
+            <pc:docMk/>
+            <pc:sldMk cId="1775599074" sldId="272"/>
+            <ac:spMk id="57" creationId="{EF7B47EA-0774-E65F-A4FC-42CE030D154D}"/>
+          </ac:spMkLst>
+        </pc:spChg>
+        <pc:spChg chg="del">
+          <ac:chgData name="XIONG Xin" userId="5005eae9-336c-4714-96df-1c1bef3d405b" providerId="ADAL" clId="{7517026C-8CF6-C54D-BD06-35289FFC2D04}" dt="2023-03-28T12:58:55.900" v="10" actId="478"/>
+          <ac:spMkLst>
+            <pc:docMk/>
+            <pc:sldMk cId="1775599074" sldId="272"/>
+            <ac:spMk id="73" creationId="{CA5BBFB8-C27C-EF54-9218-FE938C94CA79}"/>
+          </ac:spMkLst>
+        </pc:spChg>
+        <pc:spChg chg="mod">
+          <ac:chgData name="XIONG Xin" userId="5005eae9-336c-4714-96df-1c1bef3d405b" providerId="ADAL" clId="{7517026C-8CF6-C54D-BD06-35289FFC2D04}" dt="2023-03-28T13:03:34.181" v="32" actId="1076"/>
+          <ac:spMkLst>
+            <pc:docMk/>
+            <pc:sldMk cId="1775599074" sldId="272"/>
+            <ac:spMk id="97" creationId="{00000000-0000-0000-0000-000000000000}"/>
+          </ac:spMkLst>
+        </pc:spChg>
+        <pc:spChg chg="mod">
+          <ac:chgData name="XIONG Xin" userId="5005eae9-336c-4714-96df-1c1bef3d405b" providerId="ADAL" clId="{7517026C-8CF6-C54D-BD06-35289FFC2D04}" dt="2023-03-28T13:03:26.171" v="31" actId="1076"/>
+          <ac:spMkLst>
+            <pc:docMk/>
+            <pc:sldMk cId="1775599074" sldId="272"/>
+            <ac:spMk id="98" creationId="{00000000-0000-0000-0000-000000000000}"/>
+          </ac:spMkLst>
+        </pc:spChg>
+        <pc:spChg chg="del">
+          <ac:chgData name="XIONG Xin" userId="5005eae9-336c-4714-96df-1c1bef3d405b" providerId="ADAL" clId="{7517026C-8CF6-C54D-BD06-35289FFC2D04}" dt="2023-03-28T12:58:55.900" v="10" actId="478"/>
+          <ac:spMkLst>
+            <pc:docMk/>
+            <pc:sldMk cId="1775599074" sldId="272"/>
+            <ac:spMk id="99" creationId="{00000000-0000-0000-0000-000000000000}"/>
+          </ac:spMkLst>
+        </pc:spChg>
+        <pc:spChg chg="mod">
+          <ac:chgData name="XIONG Xin" userId="5005eae9-336c-4714-96df-1c1bef3d405b" providerId="ADAL" clId="{7517026C-8CF6-C54D-BD06-35289FFC2D04}" dt="2023-03-28T12:59:18.079" v="11" actId="1076"/>
+          <ac:spMkLst>
+            <pc:docMk/>
+            <pc:sldMk cId="1775599074" sldId="272"/>
+            <ac:spMk id="100" creationId="{00000000-0000-0000-0000-000000000000}"/>
+          </ac:spMkLst>
+        </pc:spChg>
+        <pc:spChg chg="mod">
+          <ac:chgData name="XIONG Xin" userId="5005eae9-336c-4714-96df-1c1bef3d405b" providerId="ADAL" clId="{7517026C-8CF6-C54D-BD06-35289FFC2D04}" dt="2023-03-28T13:06:00.938" v="50" actId="1076"/>
+          <ac:spMkLst>
+            <pc:docMk/>
+            <pc:sldMk cId="1775599074" sldId="272"/>
+            <ac:spMk id="101" creationId="{00000000-0000-0000-0000-000000000000}"/>
+          </ac:spMkLst>
+        </pc:spChg>
+        <pc:spChg chg="mod">
+          <ac:chgData name="XIONG Xin" userId="5005eae9-336c-4714-96df-1c1bef3d405b" providerId="ADAL" clId="{7517026C-8CF6-C54D-BD06-35289FFC2D04}" dt="2023-03-28T13:05:05.006" v="44" actId="1076"/>
+          <ac:spMkLst>
+            <pc:docMk/>
+            <pc:sldMk cId="1775599074" sldId="272"/>
+            <ac:spMk id="114" creationId="{00000000-0000-0000-0000-000000000000}"/>
+          </ac:spMkLst>
+        </pc:spChg>
+        <pc:spChg chg="mod">
+          <ac:chgData name="XIONG Xin" userId="5005eae9-336c-4714-96df-1c1bef3d405b" providerId="ADAL" clId="{7517026C-8CF6-C54D-BD06-35289FFC2D04}" dt="2023-03-28T13:05:05.006" v="44" actId="1076"/>
+          <ac:spMkLst>
+            <pc:docMk/>
+            <pc:sldMk cId="1775599074" sldId="272"/>
+            <ac:spMk id="116" creationId="{00000000-0000-0000-0000-000000000000}"/>
+          </ac:spMkLst>
+        </pc:spChg>
+        <pc:spChg chg="mod">
+          <ac:chgData name="XIONG Xin" userId="5005eae9-336c-4714-96df-1c1bef3d405b" providerId="ADAL" clId="{7517026C-8CF6-C54D-BD06-35289FFC2D04}" dt="2023-03-28T13:05:05.006" v="44" actId="1076"/>
+          <ac:spMkLst>
+            <pc:docMk/>
+            <pc:sldMk cId="1775599074" sldId="272"/>
+            <ac:spMk id="117" creationId="{00000000-0000-0000-0000-000000000000}"/>
+          </ac:spMkLst>
+        </pc:spChg>
+        <pc:spChg chg="mod">
+          <ac:chgData name="XIONG Xin" userId="5005eae9-336c-4714-96df-1c1bef3d405b" providerId="ADAL" clId="{7517026C-8CF6-C54D-BD06-35289FFC2D04}" dt="2023-03-28T13:05:05.006" v="44" actId="1076"/>
+          <ac:spMkLst>
+            <pc:docMk/>
+            <pc:sldMk cId="1775599074" sldId="272"/>
+            <ac:spMk id="119" creationId="{00000000-0000-0000-0000-000000000000}"/>
+          </ac:spMkLst>
+        </pc:spChg>
+        <pc:spChg chg="del">
+          <ac:chgData name="XIONG Xin" userId="5005eae9-336c-4714-96df-1c1bef3d405b" providerId="ADAL" clId="{7517026C-8CF6-C54D-BD06-35289FFC2D04}" dt="2023-03-28T12:58:55.900" v="10" actId="478"/>
+          <ac:spMkLst>
+            <pc:docMk/>
+            <pc:sldMk cId="1775599074" sldId="272"/>
+            <ac:spMk id="162" creationId="{0A18BB4A-6DEF-319F-F9D9-ADFC384210BF}"/>
+          </ac:spMkLst>
+        </pc:spChg>
+        <pc:spChg chg="del">
+          <ac:chgData name="XIONG Xin" userId="5005eae9-336c-4714-96df-1c1bef3d405b" providerId="ADAL" clId="{7517026C-8CF6-C54D-BD06-35289FFC2D04}" dt="2023-03-28T12:58:55.900" v="10" actId="478"/>
+          <ac:spMkLst>
+            <pc:docMk/>
+            <pc:sldMk cId="1775599074" sldId="272"/>
+            <ac:spMk id="163" creationId="{8FFB865D-9A22-B577-2CA1-506B4340B92E}"/>
+          </ac:spMkLst>
+        </pc:spChg>
+        <pc:spChg chg="del">
+          <ac:chgData name="XIONG Xin" userId="5005eae9-336c-4714-96df-1c1bef3d405b" providerId="ADAL" clId="{7517026C-8CF6-C54D-BD06-35289FFC2D04}" dt="2023-03-28T12:58:55.900" v="10" actId="478"/>
+          <ac:spMkLst>
+            <pc:docMk/>
+            <pc:sldMk cId="1775599074" sldId="272"/>
+            <ac:spMk id="164" creationId="{3B0D19D4-E5C1-CF7F-D34B-5D94B323E25B}"/>
+          </ac:spMkLst>
+        </pc:spChg>
+        <pc:spChg chg="del">
+          <ac:chgData name="XIONG Xin" userId="5005eae9-336c-4714-96df-1c1bef3d405b" providerId="ADAL" clId="{7517026C-8CF6-C54D-BD06-35289FFC2D04}" dt="2023-03-28T12:58:55.900" v="10" actId="478"/>
+          <ac:spMkLst>
+            <pc:docMk/>
+            <pc:sldMk cId="1775599074" sldId="272"/>
+            <ac:spMk id="165" creationId="{AC9A598D-D1DD-0276-0C10-2393CA4CBD6D}"/>
+          </ac:spMkLst>
+        </pc:spChg>
+        <pc:spChg chg="mod">
+          <ac:chgData name="XIONG Xin" userId="5005eae9-336c-4714-96df-1c1bef3d405b" providerId="ADAL" clId="{7517026C-8CF6-C54D-BD06-35289FFC2D04}" dt="2023-03-28T13:15:04.500" v="92" actId="20577"/>
+          <ac:spMkLst>
+            <pc:docMk/>
+            <pc:sldMk cId="1775599074" sldId="272"/>
+            <ac:spMk id="260" creationId="{3BA94CB2-2B62-D320-430C-D1004CE4B2C8}"/>
+          </ac:spMkLst>
+        </pc:spChg>
+        <pc:spChg chg="mod">
+          <ac:chgData name="XIONG Xin" userId="5005eae9-336c-4714-96df-1c1bef3d405b" providerId="ADAL" clId="{7517026C-8CF6-C54D-BD06-35289FFC2D04}" dt="2023-03-28T13:03:52.129" v="33" actId="1076"/>
+          <ac:spMkLst>
+            <pc:docMk/>
+            <pc:sldMk cId="1775599074" sldId="272"/>
+            <ac:spMk id="268" creationId="{618820F0-0841-877A-5DD7-FFAD622614A5}"/>
+          </ac:spMkLst>
+        </pc:spChg>
+        <pc:spChg chg="mod">
+          <ac:chgData name="XIONG Xin" userId="5005eae9-336c-4714-96df-1c1bef3d405b" providerId="ADAL" clId="{7517026C-8CF6-C54D-BD06-35289FFC2D04}" dt="2023-03-28T13:03:52.129" v="33" actId="1076"/>
+          <ac:spMkLst>
+            <pc:docMk/>
+            <pc:sldMk cId="1775599074" sldId="272"/>
+            <ac:spMk id="270" creationId="{5118BF8E-BDD8-484D-E49D-ED307B7EA0C5}"/>
+          </ac:spMkLst>
+        </pc:spChg>
+        <pc:spChg chg="mod">
+          <ac:chgData name="XIONG Xin" userId="5005eae9-336c-4714-96df-1c1bef3d405b" providerId="ADAL" clId="{7517026C-8CF6-C54D-BD06-35289FFC2D04}" dt="2023-03-28T13:03:52.129" v="33" actId="1076"/>
+          <ac:spMkLst>
+            <pc:docMk/>
+            <pc:sldMk cId="1775599074" sldId="272"/>
+            <ac:spMk id="272" creationId="{7CD81458-222C-EA5A-BAF3-913091042BB4}"/>
+          </ac:spMkLst>
+        </pc:spChg>
+        <pc:spChg chg="mod">
+          <ac:chgData name="XIONG Xin" userId="5005eae9-336c-4714-96df-1c1bef3d405b" providerId="ADAL" clId="{7517026C-8CF6-C54D-BD06-35289FFC2D04}" dt="2023-03-28T13:03:52.129" v="33" actId="1076"/>
+          <ac:spMkLst>
+            <pc:docMk/>
+            <pc:sldMk cId="1775599074" sldId="272"/>
+            <ac:spMk id="273" creationId="{52F94505-1373-5A19-A3E9-599E828F5D9C}"/>
+          </ac:spMkLst>
+        </pc:spChg>
+        <pc:spChg chg="mod">
+          <ac:chgData name="XIONG Xin" userId="5005eae9-336c-4714-96df-1c1bef3d405b" providerId="ADAL" clId="{7517026C-8CF6-C54D-BD06-35289FFC2D04}" dt="2023-03-28T13:18:26.123" v="94" actId="14100"/>
+          <ac:spMkLst>
+            <pc:docMk/>
+            <pc:sldMk cId="1775599074" sldId="272"/>
+            <ac:spMk id="283" creationId="{00000000-0000-0000-0000-000000000000}"/>
+          </ac:spMkLst>
+        </pc:spChg>
+        <pc:spChg chg="mod">
+          <ac:chgData name="XIONG Xin" userId="5005eae9-336c-4714-96df-1c1bef3d405b" providerId="ADAL" clId="{7517026C-8CF6-C54D-BD06-35289FFC2D04}" dt="2023-03-28T13:18:36.842" v="95" actId="1076"/>
+          <ac:spMkLst>
+            <pc:docMk/>
+            <pc:sldMk cId="1775599074" sldId="272"/>
+            <ac:spMk id="284" creationId="{00000000-0000-0000-0000-000000000000}"/>
+          </ac:spMkLst>
+        </pc:spChg>
+        <pc:spChg chg="mod">
+          <ac:chgData name="XIONG Xin" userId="5005eae9-336c-4714-96df-1c1bef3d405b" providerId="ADAL" clId="{7517026C-8CF6-C54D-BD06-35289FFC2D04}" dt="2023-03-28T13:06:00.938" v="50" actId="1076"/>
+          <ac:spMkLst>
+            <pc:docMk/>
+            <pc:sldMk cId="1775599074" sldId="272"/>
+            <ac:spMk id="285" creationId="{00000000-0000-0000-0000-000000000000}"/>
+          </ac:spMkLst>
+        </pc:spChg>
+        <pc:spChg chg="mod">
+          <ac:chgData name="XIONG Xin" userId="5005eae9-336c-4714-96df-1c1bef3d405b" providerId="ADAL" clId="{7517026C-8CF6-C54D-BD06-35289FFC2D04}" dt="2023-03-28T13:02:18.030" v="26" actId="1076"/>
+          <ac:spMkLst>
+            <pc:docMk/>
+            <pc:sldMk cId="1775599074" sldId="272"/>
+            <ac:spMk id="319" creationId="{47BDB519-B364-100A-FA7D-0B612A4647A6}"/>
+          </ac:spMkLst>
+        </pc:spChg>
+        <pc:spChg chg="mod">
+          <ac:chgData name="XIONG Xin" userId="5005eae9-336c-4714-96df-1c1bef3d405b" providerId="ADAL" clId="{7517026C-8CF6-C54D-BD06-35289FFC2D04}" dt="2023-03-28T13:02:18.030" v="26" actId="1076"/>
+          <ac:spMkLst>
+            <pc:docMk/>
+            <pc:sldMk cId="1775599074" sldId="272"/>
+            <ac:spMk id="320" creationId="{D06DB1A0-7F1E-D104-3726-1A312D2C6D31}"/>
+          </ac:spMkLst>
+        </pc:spChg>
+        <pc:spChg chg="mod">
+          <ac:chgData name="XIONG Xin" userId="5005eae9-336c-4714-96df-1c1bef3d405b" providerId="ADAL" clId="{7517026C-8CF6-C54D-BD06-35289FFC2D04}" dt="2023-03-28T13:02:18.030" v="26" actId="1076"/>
+          <ac:spMkLst>
+            <pc:docMk/>
+            <pc:sldMk cId="1775599074" sldId="272"/>
+            <ac:spMk id="321" creationId="{AB2EFBD7-6F14-F7AA-AFEF-DCAD6A7502A9}"/>
+          </ac:spMkLst>
+        </pc:spChg>
+        <pc:spChg chg="mod">
+          <ac:chgData name="XIONG Xin" userId="5005eae9-336c-4714-96df-1c1bef3d405b" providerId="ADAL" clId="{7517026C-8CF6-C54D-BD06-35289FFC2D04}" dt="2023-03-28T13:02:18.030" v="26" actId="1076"/>
+          <ac:spMkLst>
+            <pc:docMk/>
+            <pc:sldMk cId="1775599074" sldId="272"/>
+            <ac:spMk id="322" creationId="{3F3C146D-6CCD-9760-2E70-1D44E3293789}"/>
+          </ac:spMkLst>
+        </pc:spChg>
+        <pc:picChg chg="del">
+          <ac:chgData name="XIONG Xin" userId="5005eae9-336c-4714-96df-1c1bef3d405b" providerId="ADAL" clId="{7517026C-8CF6-C54D-BD06-35289FFC2D04}" dt="2023-03-28T12:58:40.622" v="9" actId="478"/>
+          <ac:picMkLst>
+            <pc:docMk/>
+            <pc:sldMk cId="1775599074" sldId="272"/>
+            <ac:picMk id="145" creationId="{E4201288-E7CD-3D67-5EE4-BBD68D6ECA78}"/>
+          </ac:picMkLst>
+        </pc:picChg>
+        <pc:cxnChg chg="mod">
+          <ac:chgData name="XIONG Xin" userId="5005eae9-336c-4714-96df-1c1bef3d405b" providerId="ADAL" clId="{7517026C-8CF6-C54D-BD06-35289FFC2D04}" dt="2023-03-28T13:15:30.170" v="93" actId="1037"/>
+          <ac:cxnSpMkLst>
+            <pc:docMk/>
+            <pc:sldMk cId="1775599074" sldId="272"/>
+            <ac:cxnSpMk id="29" creationId="{E488F9A4-3B3A-4889-B737-5F24B8E0A199}"/>
+          </ac:cxnSpMkLst>
+        </pc:cxnChg>
+        <pc:cxnChg chg="mod">
+          <ac:chgData name="XIONG Xin" userId="5005eae9-336c-4714-96df-1c1bef3d405b" providerId="ADAL" clId="{7517026C-8CF6-C54D-BD06-35289FFC2D04}" dt="2023-03-28T13:03:52.129" v="33" actId="1076"/>
+          <ac:cxnSpMkLst>
+            <pc:docMk/>
+            <pc:sldMk cId="1775599074" sldId="272"/>
+            <ac:cxnSpMk id="30" creationId="{53B39DA2-5082-4479-A08A-682A5F86AADA}"/>
+          </ac:cxnSpMkLst>
+        </pc:cxnChg>
+        <pc:cxnChg chg="mod">
+          <ac:chgData name="XIONG Xin" userId="5005eae9-336c-4714-96df-1c1bef3d405b" providerId="ADAL" clId="{7517026C-8CF6-C54D-BD06-35289FFC2D04}" dt="2023-03-28T13:02:18.030" v="26" actId="1076"/>
+          <ac:cxnSpMkLst>
+            <pc:docMk/>
+            <pc:sldMk cId="1775599074" sldId="272"/>
+            <ac:cxnSpMk id="31" creationId="{F14A77D5-CDF1-44B2-A689-292EC312277B}"/>
+          </ac:cxnSpMkLst>
+        </pc:cxnChg>
+        <pc:cxnChg chg="del mod">
+          <ac:chgData name="XIONG Xin" userId="5005eae9-336c-4714-96df-1c1bef3d405b" providerId="ADAL" clId="{7517026C-8CF6-C54D-BD06-35289FFC2D04}" dt="2023-03-28T12:58:55.900" v="10" actId="478"/>
+          <ac:cxnSpMkLst>
+            <pc:docMk/>
+            <pc:sldMk cId="1775599074" sldId="272"/>
+            <ac:cxnSpMk id="32" creationId="{F4EABDDA-D041-4BFC-B6D5-25CCC154AFFE}"/>
+          </ac:cxnSpMkLst>
+        </pc:cxnChg>
+        <pc:cxnChg chg="mod">
+          <ac:chgData name="XIONG Xin" userId="5005eae9-336c-4714-96df-1c1bef3d405b" providerId="ADAL" clId="{7517026C-8CF6-C54D-BD06-35289FFC2D04}" dt="2023-03-28T13:03:34.181" v="32" actId="1076"/>
+          <ac:cxnSpMkLst>
+            <pc:docMk/>
+            <pc:sldMk cId="1775599074" sldId="272"/>
+            <ac:cxnSpMk id="37" creationId="{00000000-0000-0000-0000-000000000000}"/>
+          </ac:cxnSpMkLst>
+        </pc:cxnChg>
+        <pc:cxnChg chg="mod">
+          <ac:chgData name="XIONG Xin" userId="5005eae9-336c-4714-96df-1c1bef3d405b" providerId="ADAL" clId="{7517026C-8CF6-C54D-BD06-35289FFC2D04}" dt="2023-03-28T13:05:41.888" v="49" actId="1037"/>
+          <ac:cxnSpMkLst>
+            <pc:docMk/>
+            <pc:sldMk cId="1775599074" sldId="272"/>
+            <ac:cxnSpMk id="40" creationId="{00000000-0000-0000-0000-000000000000}"/>
+          </ac:cxnSpMkLst>
+        </pc:cxnChg>
+        <pc:cxnChg chg="mod">
+          <ac:chgData name="XIONG Xin" userId="5005eae9-336c-4714-96df-1c1bef3d405b" providerId="ADAL" clId="{7517026C-8CF6-C54D-BD06-35289FFC2D04}" dt="2023-03-28T13:05:36.789" v="48" actId="1037"/>
+          <ac:cxnSpMkLst>
+            <pc:docMk/>
+            <pc:sldMk cId="1775599074" sldId="272"/>
+            <ac:cxnSpMk id="41" creationId="{00000000-0000-0000-0000-000000000000}"/>
+          </ac:cxnSpMkLst>
+        </pc:cxnChg>
+        <pc:cxnChg chg="mod">
+          <ac:chgData name="XIONG Xin" userId="5005eae9-336c-4714-96df-1c1bef3d405b" providerId="ADAL" clId="{7517026C-8CF6-C54D-BD06-35289FFC2D04}" dt="2023-03-28T13:15:30.170" v="93" actId="1037"/>
+          <ac:cxnSpMkLst>
+            <pc:docMk/>
+            <pc:sldMk cId="1775599074" sldId="272"/>
+            <ac:cxnSpMk id="54" creationId="{00000000-0000-0000-0000-000000000000}"/>
+          </ac:cxnSpMkLst>
+        </pc:cxnChg>
+        <pc:cxnChg chg="mod">
+          <ac:chgData name="XIONG Xin" userId="5005eae9-336c-4714-96df-1c1bef3d405b" providerId="ADAL" clId="{7517026C-8CF6-C54D-BD06-35289FFC2D04}" dt="2023-03-28T13:05:36.789" v="48" actId="1037"/>
+          <ac:cxnSpMkLst>
+            <pc:docMk/>
+            <pc:sldMk cId="1775599074" sldId="272"/>
+            <ac:cxnSpMk id="55" creationId="{00000000-0000-0000-0000-000000000000}"/>
+          </ac:cxnSpMkLst>
+        </pc:cxnChg>
+        <pc:cxnChg chg="mod">
+          <ac:chgData name="XIONG Xin" userId="5005eae9-336c-4714-96df-1c1bef3d405b" providerId="ADAL" clId="{7517026C-8CF6-C54D-BD06-35289FFC2D04}" dt="2023-03-28T13:05:41.888" v="49" actId="1037"/>
+          <ac:cxnSpMkLst>
+            <pc:docMk/>
+            <pc:sldMk cId="1775599074" sldId="272"/>
+            <ac:cxnSpMk id="56" creationId="{00000000-0000-0000-0000-000000000000}"/>
+          </ac:cxnSpMkLst>
+        </pc:cxnChg>
+        <pc:cxnChg chg="mod">
+          <ac:chgData name="XIONG Xin" userId="5005eae9-336c-4714-96df-1c1bef3d405b" providerId="ADAL" clId="{7517026C-8CF6-C54D-BD06-35289FFC2D04}" dt="2023-03-28T13:03:34.181" v="32" actId="1076"/>
+          <ac:cxnSpMkLst>
+            <pc:docMk/>
+            <pc:sldMk cId="1775599074" sldId="272"/>
+            <ac:cxnSpMk id="59" creationId="{00000000-0000-0000-0000-000000000000}"/>
+          </ac:cxnSpMkLst>
+        </pc:cxnChg>
+        <pc:cxnChg chg="mod">
+          <ac:chgData name="XIONG Xin" userId="5005eae9-336c-4714-96df-1c1bef3d405b" providerId="ADAL" clId="{7517026C-8CF6-C54D-BD06-35289FFC2D04}" dt="2023-03-28T13:03:52.129" v="33" actId="1076"/>
+          <ac:cxnSpMkLst>
+            <pc:docMk/>
+            <pc:sldMk cId="1775599074" sldId="272"/>
+            <ac:cxnSpMk id="60" creationId="{00000000-0000-0000-0000-000000000000}"/>
+          </ac:cxnSpMkLst>
+        </pc:cxnChg>
+        <pc:cxnChg chg="mod">
+          <ac:chgData name="XIONG Xin" userId="5005eae9-336c-4714-96df-1c1bef3d405b" providerId="ADAL" clId="{7517026C-8CF6-C54D-BD06-35289FFC2D04}" dt="2023-03-28T13:03:52.129" v="33" actId="1076"/>
+          <ac:cxnSpMkLst>
+            <pc:docMk/>
+            <pc:sldMk cId="1775599074" sldId="272"/>
+            <ac:cxnSpMk id="63" creationId="{00000000-0000-0000-0000-000000000000}"/>
+          </ac:cxnSpMkLst>
+        </pc:cxnChg>
+        <pc:cxnChg chg="mod">
+          <ac:chgData name="XIONG Xin" userId="5005eae9-336c-4714-96df-1c1bef3d405b" providerId="ADAL" clId="{7517026C-8CF6-C54D-BD06-35289FFC2D04}" dt="2023-03-28T13:03:52.129" v="33" actId="1076"/>
+          <ac:cxnSpMkLst>
+            <pc:docMk/>
+            <pc:sldMk cId="1775599074" sldId="272"/>
+            <ac:cxnSpMk id="66" creationId="{00000000-0000-0000-0000-000000000000}"/>
+          </ac:cxnSpMkLst>
+        </pc:cxnChg>
+        <pc:cxnChg chg="mod">
+          <ac:chgData name="XIONG Xin" userId="5005eae9-336c-4714-96df-1c1bef3d405b" providerId="ADAL" clId="{7517026C-8CF6-C54D-BD06-35289FFC2D04}" dt="2023-03-28T13:02:18.030" v="26" actId="1076"/>
+          <ac:cxnSpMkLst>
+            <pc:docMk/>
+            <pc:sldMk cId="1775599074" sldId="272"/>
+            <ac:cxnSpMk id="68" creationId="{00000000-0000-0000-0000-000000000000}"/>
+          </ac:cxnSpMkLst>
+        </pc:cxnChg>
+        <pc:cxnChg chg="mod">
+          <ac:chgData name="XIONG Xin" userId="5005eae9-336c-4714-96df-1c1bef3d405b" providerId="ADAL" clId="{7517026C-8CF6-C54D-BD06-35289FFC2D04}" dt="2023-03-28T13:02:18.030" v="26" actId="1076"/>
+          <ac:cxnSpMkLst>
+            <pc:docMk/>
+            <pc:sldMk cId="1775599074" sldId="272"/>
+            <ac:cxnSpMk id="71" creationId="{00000000-0000-0000-0000-000000000000}"/>
+          </ac:cxnSpMkLst>
+        </pc:cxnChg>
+        <pc:cxnChg chg="mod">
+          <ac:chgData name="XIONG Xin" userId="5005eae9-336c-4714-96df-1c1bef3d405b" providerId="ADAL" clId="{7517026C-8CF6-C54D-BD06-35289FFC2D04}" dt="2023-03-28T13:02:18.030" v="26" actId="1076"/>
+          <ac:cxnSpMkLst>
+            <pc:docMk/>
+            <pc:sldMk cId="1775599074" sldId="272"/>
+            <ac:cxnSpMk id="72" creationId="{00000000-0000-0000-0000-000000000000}"/>
+          </ac:cxnSpMkLst>
+        </pc:cxnChg>
+        <pc:cxnChg chg="del mod">
+          <ac:chgData name="XIONG Xin" userId="5005eae9-336c-4714-96df-1c1bef3d405b" providerId="ADAL" clId="{7517026C-8CF6-C54D-BD06-35289FFC2D04}" dt="2023-03-28T12:58:55.900" v="10" actId="478"/>
+          <ac:cxnSpMkLst>
+            <pc:docMk/>
+            <pc:sldMk cId="1775599074" sldId="272"/>
+            <ac:cxnSpMk id="75" creationId="{00000000-0000-0000-0000-000000000000}"/>
+          </ac:cxnSpMkLst>
+        </pc:cxnChg>
+        <pc:cxnChg chg="del mod">
+          <ac:chgData name="XIONG Xin" userId="5005eae9-336c-4714-96df-1c1bef3d405b" providerId="ADAL" clId="{7517026C-8CF6-C54D-BD06-35289FFC2D04}" dt="2023-03-28T13:04:04.250" v="35" actId="478"/>
+          <ac:cxnSpMkLst>
+            <pc:docMk/>
+            <pc:sldMk cId="1775599074" sldId="272"/>
+            <ac:cxnSpMk id="90" creationId="{00000000-0000-0000-0000-000000000000}"/>
+          </ac:cxnSpMkLst>
+        </pc:cxnChg>
+        <pc:cxnChg chg="del mod">
+          <ac:chgData name="XIONG Xin" userId="5005eae9-336c-4714-96df-1c1bef3d405b" providerId="ADAL" clId="{7517026C-8CF6-C54D-BD06-35289FFC2D04}" dt="2023-03-28T12:58:55.900" v="10" actId="478"/>
+          <ac:cxnSpMkLst>
+            <pc:docMk/>
+            <pc:sldMk cId="1775599074" sldId="272"/>
+            <ac:cxnSpMk id="124" creationId="{00000000-0000-0000-0000-000000000000}"/>
+          </ac:cxnSpMkLst>
+        </pc:cxnChg>
+        <pc:cxnChg chg="del mod">
+          <ac:chgData name="XIONG Xin" userId="5005eae9-336c-4714-96df-1c1bef3d405b" providerId="ADAL" clId="{7517026C-8CF6-C54D-BD06-35289FFC2D04}" dt="2023-03-28T12:58:55.900" v="10" actId="478"/>
+          <ac:cxnSpMkLst>
+            <pc:docMk/>
+            <pc:sldMk cId="1775599074" sldId="272"/>
+            <ac:cxnSpMk id="139" creationId="{00000000-0000-0000-0000-000000000000}"/>
+          </ac:cxnSpMkLst>
+        </pc:cxnChg>
+        <pc:cxnChg chg="mod">
+          <ac:chgData name="XIONG Xin" userId="5005eae9-336c-4714-96df-1c1bef3d405b" providerId="ADAL" clId="{7517026C-8CF6-C54D-BD06-35289FFC2D04}" dt="2023-03-28T13:06:00.938" v="50" actId="1076"/>
+          <ac:cxnSpMkLst>
+            <pc:docMk/>
+            <pc:sldMk cId="1775599074" sldId="272"/>
+            <ac:cxnSpMk id="142" creationId="{00000000-0000-0000-0000-000000000000}"/>
+          </ac:cxnSpMkLst>
+        </pc:cxnChg>
+        <pc:cxnChg chg="mod">
+          <ac:chgData name="XIONG Xin" userId="5005eae9-336c-4714-96df-1c1bef3d405b" providerId="ADAL" clId="{7517026C-8CF6-C54D-BD06-35289FFC2D04}" dt="2023-03-28T13:06:00.938" v="50" actId="1076"/>
+          <ac:cxnSpMkLst>
+            <pc:docMk/>
+            <pc:sldMk cId="1775599074" sldId="272"/>
+            <ac:cxnSpMk id="143" creationId="{00000000-0000-0000-0000-000000000000}"/>
+          </ac:cxnSpMkLst>
+        </pc:cxnChg>
+        <pc:cxnChg chg="mod">
+          <ac:chgData name="XIONG Xin" userId="5005eae9-336c-4714-96df-1c1bef3d405b" providerId="ADAL" clId="{7517026C-8CF6-C54D-BD06-35289FFC2D04}" dt="2023-03-28T13:06:00.938" v="50" actId="1076"/>
+          <ac:cxnSpMkLst>
+            <pc:docMk/>
+            <pc:sldMk cId="1775599074" sldId="272"/>
+            <ac:cxnSpMk id="152" creationId="{00000000-0000-0000-0000-000000000000}"/>
+          </ac:cxnSpMkLst>
+        </pc:cxnChg>
+        <pc:cxnChg chg="mod">
+          <ac:chgData name="XIONG Xin" userId="5005eae9-336c-4714-96df-1c1bef3d405b" providerId="ADAL" clId="{7517026C-8CF6-C54D-BD06-35289FFC2D04}" dt="2023-03-28T13:06:00.938" v="50" actId="1076"/>
+          <ac:cxnSpMkLst>
+            <pc:docMk/>
+            <pc:sldMk cId="1775599074" sldId="272"/>
+            <ac:cxnSpMk id="153" creationId="{00000000-0000-0000-0000-000000000000}"/>
+          </ac:cxnSpMkLst>
+        </pc:cxnChg>
+        <pc:cxnChg chg="mod">
+          <ac:chgData name="XIONG Xin" userId="5005eae9-336c-4714-96df-1c1bef3d405b" providerId="ADAL" clId="{7517026C-8CF6-C54D-BD06-35289FFC2D04}" dt="2023-03-28T13:05:05.006" v="44" actId="1076"/>
+          <ac:cxnSpMkLst>
+            <pc:docMk/>
+            <pc:sldMk cId="1775599074" sldId="272"/>
+            <ac:cxnSpMk id="184" creationId="{E6F83AE0-7ED0-86B1-87FB-9E24A5764772}"/>
+          </ac:cxnSpMkLst>
+        </pc:cxnChg>
+        <pc:cxnChg chg="mod">
+          <ac:chgData name="XIONG Xin" userId="5005eae9-336c-4714-96df-1c1bef3d405b" providerId="ADAL" clId="{7517026C-8CF6-C54D-BD06-35289FFC2D04}" dt="2023-03-28T13:05:05.006" v="44" actId="1076"/>
+          <ac:cxnSpMkLst>
+            <pc:docMk/>
+            <pc:sldMk cId="1775599074" sldId="272"/>
+            <ac:cxnSpMk id="187" creationId="{F4EABDDA-D041-4BFC-B6D5-25CCC154AFFE}"/>
+          </ac:cxnSpMkLst>
+        </pc:cxnChg>
+        <pc:cxnChg chg="mod">
+          <ac:chgData name="XIONG Xin" userId="5005eae9-336c-4714-96df-1c1bef3d405b" providerId="ADAL" clId="{7517026C-8CF6-C54D-BD06-35289FFC2D04}" dt="2023-03-28T13:05:05.006" v="44" actId="1076"/>
+          <ac:cxnSpMkLst>
+            <pc:docMk/>
+            <pc:sldMk cId="1775599074" sldId="272"/>
+            <ac:cxnSpMk id="190" creationId="{F4EABDDA-D041-4BFC-B6D5-25CCC154AFFE}"/>
+          </ac:cxnSpMkLst>
+        </pc:cxnChg>
+        <pc:cxnChg chg="mod">
+          <ac:chgData name="XIONG Xin" userId="5005eae9-336c-4714-96df-1c1bef3d405b" providerId="ADAL" clId="{7517026C-8CF6-C54D-BD06-35289FFC2D04}" dt="2023-03-28T13:05:05.006" v="44" actId="1076"/>
+          <ac:cxnSpMkLst>
+            <pc:docMk/>
+            <pc:sldMk cId="1775599074" sldId="272"/>
+            <ac:cxnSpMk id="257" creationId="{F4EABDDA-D041-4BFC-B6D5-25CCC154AFFE}"/>
+          </ac:cxnSpMkLst>
+        </pc:cxnChg>
+        <pc:cxnChg chg="mod">
+          <ac:chgData name="XIONG Xin" userId="5005eae9-336c-4714-96df-1c1bef3d405b" providerId="ADAL" clId="{7517026C-8CF6-C54D-BD06-35289FFC2D04}" dt="2023-03-28T13:03:52.129" v="33" actId="1076"/>
+          <ac:cxnSpMkLst>
+            <pc:docMk/>
+            <pc:sldMk cId="1775599074" sldId="272"/>
+            <ac:cxnSpMk id="323" creationId="{A4D124D0-FF9F-6BF7-C2E5-51D43EA2BB0B}"/>
+          </ac:cxnSpMkLst>
+        </pc:cxnChg>
+        <pc:cxnChg chg="mod">
+          <ac:chgData name="XIONG Xin" userId="5005eae9-336c-4714-96df-1c1bef3d405b" providerId="ADAL" clId="{7517026C-8CF6-C54D-BD06-35289FFC2D04}" dt="2023-03-28T13:03:52.129" v="33" actId="1076"/>
+          <ac:cxnSpMkLst>
+            <pc:docMk/>
+            <pc:sldMk cId="1775599074" sldId="272"/>
+            <ac:cxnSpMk id="327" creationId="{4D95FEFC-98BC-5556-5592-25F60862F9CC}"/>
+          </ac:cxnSpMkLst>
+        </pc:cxnChg>
+        <pc:cxnChg chg="mod">
+          <ac:chgData name="XIONG Xin" userId="5005eae9-336c-4714-96df-1c1bef3d405b" providerId="ADAL" clId="{7517026C-8CF6-C54D-BD06-35289FFC2D04}" dt="2023-03-28T13:03:52.129" v="33" actId="1076"/>
+          <ac:cxnSpMkLst>
+            <pc:docMk/>
+            <pc:sldMk cId="1775599074" sldId="272"/>
+            <ac:cxnSpMk id="330" creationId="{A4D124D0-FF9F-6BF7-C2E5-51D43EA2BB0B}"/>
+          </ac:cxnSpMkLst>
+        </pc:cxnChg>
+        <pc:cxnChg chg="mod">
+          <ac:chgData name="XIONG Xin" userId="5005eae9-336c-4714-96df-1c1bef3d405b" providerId="ADAL" clId="{7517026C-8CF6-C54D-BD06-35289FFC2D04}" dt="2023-03-28T13:03:52.129" v="33" actId="1076"/>
+          <ac:cxnSpMkLst>
+            <pc:docMk/>
+            <pc:sldMk cId="1775599074" sldId="272"/>
+            <ac:cxnSpMk id="333" creationId="{A4D124D0-FF9F-6BF7-C2E5-51D43EA2BB0B}"/>
+          </ac:cxnSpMkLst>
+        </pc:cxnChg>
+        <pc:cxnChg chg="del mod">
+          <ac:chgData name="XIONG Xin" userId="5005eae9-336c-4714-96df-1c1bef3d405b" providerId="ADAL" clId="{7517026C-8CF6-C54D-BD06-35289FFC2D04}" dt="2023-03-28T13:04:06.356" v="37" actId="478"/>
+          <ac:cxnSpMkLst>
+            <pc:docMk/>
+            <pc:sldMk cId="1775599074" sldId="272"/>
+            <ac:cxnSpMk id="390" creationId="{CF5E2BA7-395F-6FC0-63F0-D2805FB916DD}"/>
+          </ac:cxnSpMkLst>
+        </pc:cxnChg>
+        <pc:cxnChg chg="del mod">
+          <ac:chgData name="XIONG Xin" userId="5005eae9-336c-4714-96df-1c1bef3d405b" providerId="ADAL" clId="{7517026C-8CF6-C54D-BD06-35289FFC2D04}" dt="2023-03-28T13:04:03.181" v="34" actId="478"/>
+          <ac:cxnSpMkLst>
+            <pc:docMk/>
+            <pc:sldMk cId="1775599074" sldId="272"/>
+            <ac:cxnSpMk id="395" creationId="{1554EAA2-0EF0-60A6-5CEE-294D66B187FD}"/>
+          </ac:cxnSpMkLst>
+        </pc:cxnChg>
+        <pc:cxnChg chg="del mod">
+          <ac:chgData name="XIONG Xin" userId="5005eae9-336c-4714-96df-1c1bef3d405b" providerId="ADAL" clId="{7517026C-8CF6-C54D-BD06-35289FFC2D04}" dt="2023-03-28T13:04:05.455" v="36" actId="478"/>
+          <ac:cxnSpMkLst>
+            <pc:docMk/>
+            <pc:sldMk cId="1775599074" sldId="272"/>
+            <ac:cxnSpMk id="398" creationId="{DE50CC46-A0D0-C32E-679C-BC945F624D2A}"/>
+          </ac:cxnSpMkLst>
+        </pc:cxnChg>
+      </pc:sldChg>
+    </pc:docChg>
+  </pc:docChgLst>
+  <pc:docChgLst>
     <pc:chgData name="Xin XIONG" userId="5005eae9-336c-4714-96df-1c1bef3d405b" providerId="ADAL" clId="{C266C686-C2EA-C444-8EC4-D65B66138257}"/>
     <pc:docChg chg="modSld">
       <pc:chgData name="Xin XIONG" userId="5005eae9-336c-4714-96df-1c1bef3d405b" providerId="ADAL" clId="{C266C686-C2EA-C444-8EC4-D65B66138257}" dt="2022-12-29T03:12:35.548" v="7" actId="1076"/>
@@ -1562,718 +2274,6 @@
           <ac:cxnSpMkLst>
             <pc:docMk/>
             <pc:sldMk cId="2820891288" sldId="270"/>
-            <ac:cxnSpMk id="398" creationId="{DE50CC46-A0D0-C32E-679C-BC945F624D2A}"/>
-          </ac:cxnSpMkLst>
-        </pc:cxnChg>
-      </pc:sldChg>
-    </pc:docChg>
-  </pc:docChgLst>
-  <pc:docChgLst>
-    <pc:chgData name="XIONG Xin" userId="5005eae9-336c-4714-96df-1c1bef3d405b" providerId="ADAL" clId="{7517026C-8CF6-C54D-BD06-35289FFC2D04}"/>
-    <pc:docChg chg="custSel addSld modSld">
-      <pc:chgData name="XIONG Xin" userId="5005eae9-336c-4714-96df-1c1bef3d405b" providerId="ADAL" clId="{7517026C-8CF6-C54D-BD06-35289FFC2D04}" dt="2023-03-28T13:25:42.303" v="121" actId="1076"/>
-      <pc:docMkLst>
-        <pc:docMk/>
-      </pc:docMkLst>
-      <pc:sldChg chg="delSp modSp add mod">
-        <pc:chgData name="XIONG Xin" userId="5005eae9-336c-4714-96df-1c1bef3d405b" providerId="ADAL" clId="{7517026C-8CF6-C54D-BD06-35289FFC2D04}" dt="2023-03-28T13:25:42.303" v="121" actId="1076"/>
-        <pc:sldMkLst>
-          <pc:docMk/>
-          <pc:sldMk cId="1775599074" sldId="272"/>
-        </pc:sldMkLst>
-        <pc:spChg chg="mod">
-          <ac:chgData name="XIONG Xin" userId="5005eae9-336c-4714-96df-1c1bef3d405b" providerId="ADAL" clId="{7517026C-8CF6-C54D-BD06-35289FFC2D04}" dt="2023-03-28T13:06:14.691" v="52" actId="1076"/>
-          <ac:spMkLst>
-            <pc:docMk/>
-            <pc:sldMk cId="1775599074" sldId="272"/>
-            <ac:spMk id="5" creationId="{32889513-EC9E-477F-9F3D-42850493D2FF}"/>
-          </ac:spMkLst>
-        </pc:spChg>
-        <pc:spChg chg="mod">
-          <ac:chgData name="XIONG Xin" userId="5005eae9-336c-4714-96df-1c1bef3d405b" providerId="ADAL" clId="{7517026C-8CF6-C54D-BD06-35289FFC2D04}" dt="2023-03-28T13:03:34.181" v="32" actId="1076"/>
-          <ac:spMkLst>
-            <pc:docMk/>
-            <pc:sldMk cId="1775599074" sldId="272"/>
-            <ac:spMk id="6" creationId="{D0B62F09-24B3-46E4-BD95-873F0F398FEF}"/>
-          </ac:spMkLst>
-        </pc:spChg>
-        <pc:spChg chg="mod">
-          <ac:chgData name="XIONG Xin" userId="5005eae9-336c-4714-96df-1c1bef3d405b" providerId="ADAL" clId="{7517026C-8CF6-C54D-BD06-35289FFC2D04}" dt="2023-03-28T13:05:41.888" v="49" actId="1037"/>
-          <ac:spMkLst>
-            <pc:docMk/>
-            <pc:sldMk cId="1775599074" sldId="272"/>
-            <ac:spMk id="8" creationId="{692BA9B7-DBA1-4B03-8017-9CCFD79C9200}"/>
-          </ac:spMkLst>
-        </pc:spChg>
-        <pc:spChg chg="mod">
-          <ac:chgData name="XIONG Xin" userId="5005eae9-336c-4714-96df-1c1bef3d405b" providerId="ADAL" clId="{7517026C-8CF6-C54D-BD06-35289FFC2D04}" dt="2023-03-28T13:05:36.789" v="48" actId="1037"/>
-          <ac:spMkLst>
-            <pc:docMk/>
-            <pc:sldMk cId="1775599074" sldId="272"/>
-            <ac:spMk id="9" creationId="{9B1B1EA1-194D-4285-B89D-A71A59B17781}"/>
-          </ac:spMkLst>
-        </pc:spChg>
-        <pc:spChg chg="mod">
-          <ac:chgData name="XIONG Xin" userId="5005eae9-336c-4714-96df-1c1bef3d405b" providerId="ADAL" clId="{7517026C-8CF6-C54D-BD06-35289FFC2D04}" dt="2023-03-28T13:15:30.170" v="93" actId="1037"/>
-          <ac:spMkLst>
-            <pc:docMk/>
-            <pc:sldMk cId="1775599074" sldId="272"/>
-            <ac:spMk id="11" creationId="{A9A6ABCE-8F99-4B94-9352-F1858D5D0BF2}"/>
-          </ac:spMkLst>
-        </pc:spChg>
-        <pc:spChg chg="mod">
-          <ac:chgData name="XIONG Xin" userId="5005eae9-336c-4714-96df-1c1bef3d405b" providerId="ADAL" clId="{7517026C-8CF6-C54D-BD06-35289FFC2D04}" dt="2023-03-28T13:03:34.181" v="32" actId="1076"/>
-          <ac:spMkLst>
-            <pc:docMk/>
-            <pc:sldMk cId="1775599074" sldId="272"/>
-            <ac:spMk id="12" creationId="{B1C3650E-72C8-4DA1-B8CE-5802BAAE0607}"/>
-          </ac:spMkLst>
-        </pc:spChg>
-        <pc:spChg chg="mod">
-          <ac:chgData name="XIONG Xin" userId="5005eae9-336c-4714-96df-1c1bef3d405b" providerId="ADAL" clId="{7517026C-8CF6-C54D-BD06-35289FFC2D04}" dt="2023-03-28T13:03:26.171" v="31" actId="1076"/>
-          <ac:spMkLst>
-            <pc:docMk/>
-            <pc:sldMk cId="1775599074" sldId="272"/>
-            <ac:spMk id="13" creationId="{9491EB98-F89B-4B44-AEC0-E5CD72B75861}"/>
-          </ac:spMkLst>
-        </pc:spChg>
-        <pc:spChg chg="mod">
-          <ac:chgData name="XIONG Xin" userId="5005eae9-336c-4714-96df-1c1bef3d405b" providerId="ADAL" clId="{7517026C-8CF6-C54D-BD06-35289FFC2D04}" dt="2023-03-28T13:03:26.171" v="31" actId="1076"/>
-          <ac:spMkLst>
-            <pc:docMk/>
-            <pc:sldMk cId="1775599074" sldId="272"/>
-            <ac:spMk id="15" creationId="{03DBE21B-2CDA-42F3-A189-30B0C1C4C2CB}"/>
-          </ac:spMkLst>
-        </pc:spChg>
-        <pc:spChg chg="mod">
-          <ac:chgData name="XIONG Xin" userId="5005eae9-336c-4714-96df-1c1bef3d405b" providerId="ADAL" clId="{7517026C-8CF6-C54D-BD06-35289FFC2D04}" dt="2023-03-28T13:03:26.171" v="31" actId="1076"/>
-          <ac:spMkLst>
-            <pc:docMk/>
-            <pc:sldMk cId="1775599074" sldId="272"/>
-            <ac:spMk id="17" creationId="{E7BE5D92-7D20-4EF7-90D3-C6544B8ABE60}"/>
-          </ac:spMkLst>
-        </pc:spChg>
-        <pc:spChg chg="mod">
-          <ac:chgData name="XIONG Xin" userId="5005eae9-336c-4714-96df-1c1bef3d405b" providerId="ADAL" clId="{7517026C-8CF6-C54D-BD06-35289FFC2D04}" dt="2023-03-28T12:59:18.079" v="11" actId="1076"/>
-          <ac:spMkLst>
-            <pc:docMk/>
-            <pc:sldMk cId="1775599074" sldId="272"/>
-            <ac:spMk id="18" creationId="{594643AC-EA3E-4043-9605-EC24804F8023}"/>
-          </ac:spMkLst>
-        </pc:spChg>
-        <pc:spChg chg="mod">
-          <ac:chgData name="XIONG Xin" userId="5005eae9-336c-4714-96df-1c1bef3d405b" providerId="ADAL" clId="{7517026C-8CF6-C54D-BD06-35289FFC2D04}" dt="2023-03-28T12:59:18.079" v="11" actId="1076"/>
-          <ac:spMkLst>
-            <pc:docMk/>
-            <pc:sldMk cId="1775599074" sldId="272"/>
-            <ac:spMk id="19" creationId="{04B95AD8-3E0A-4BF6-A4F5-C01D0A16AF1D}"/>
-          </ac:spMkLst>
-        </pc:spChg>
-        <pc:spChg chg="mod">
-          <ac:chgData name="XIONG Xin" userId="5005eae9-336c-4714-96df-1c1bef3d405b" providerId="ADAL" clId="{7517026C-8CF6-C54D-BD06-35289FFC2D04}" dt="2023-03-28T12:59:18.079" v="11" actId="1076"/>
-          <ac:spMkLst>
-            <pc:docMk/>
-            <pc:sldMk cId="1775599074" sldId="272"/>
-            <ac:spMk id="20" creationId="{F430D4D2-4574-49AE-BA5C-B0F8749EDC54}"/>
-          </ac:spMkLst>
-        </pc:spChg>
-        <pc:spChg chg="del">
-          <ac:chgData name="XIONG Xin" userId="5005eae9-336c-4714-96df-1c1bef3d405b" providerId="ADAL" clId="{7517026C-8CF6-C54D-BD06-35289FFC2D04}" dt="2023-03-28T12:58:55.900" v="10" actId="478"/>
-          <ac:spMkLst>
-            <pc:docMk/>
-            <pc:sldMk cId="1775599074" sldId="272"/>
-            <ac:spMk id="21" creationId="{84F53A0B-12F6-4AE1-B7D5-A5F98940778E}"/>
-          </ac:spMkLst>
-        </pc:spChg>
-        <pc:spChg chg="del">
-          <ac:chgData name="XIONG Xin" userId="5005eae9-336c-4714-96df-1c1bef3d405b" providerId="ADAL" clId="{7517026C-8CF6-C54D-BD06-35289FFC2D04}" dt="2023-03-28T12:58:55.900" v="10" actId="478"/>
-          <ac:spMkLst>
-            <pc:docMk/>
-            <pc:sldMk cId="1775599074" sldId="272"/>
-            <ac:spMk id="23" creationId="{102D27A5-EAFC-45C5-992C-8E8944B49DDB}"/>
-          </ac:spMkLst>
-        </pc:spChg>
-        <pc:spChg chg="del">
-          <ac:chgData name="XIONG Xin" userId="5005eae9-336c-4714-96df-1c1bef3d405b" providerId="ADAL" clId="{7517026C-8CF6-C54D-BD06-35289FFC2D04}" dt="2023-03-28T12:58:55.900" v="10" actId="478"/>
-          <ac:spMkLst>
-            <pc:docMk/>
-            <pc:sldMk cId="1775599074" sldId="272"/>
-            <ac:spMk id="25" creationId="{403946AC-F032-408A-8DD5-C69DD4CF5F86}"/>
-          </ac:spMkLst>
-        </pc:spChg>
-        <pc:spChg chg="mod">
-          <ac:chgData name="XIONG Xin" userId="5005eae9-336c-4714-96df-1c1bef3d405b" providerId="ADAL" clId="{7517026C-8CF6-C54D-BD06-35289FFC2D04}" dt="2023-03-28T13:06:00.938" v="50" actId="1076"/>
-          <ac:spMkLst>
-            <pc:docMk/>
-            <pc:sldMk cId="1775599074" sldId="272"/>
-            <ac:spMk id="26" creationId="{F7956298-CBC5-4613-8803-AD900C6C25E8}"/>
-          </ac:spMkLst>
-        </pc:spChg>
-        <pc:spChg chg="mod">
-          <ac:chgData name="XIONG Xin" userId="5005eae9-336c-4714-96df-1c1bef3d405b" providerId="ADAL" clId="{7517026C-8CF6-C54D-BD06-35289FFC2D04}" dt="2023-03-28T13:06:00.938" v="50" actId="1076"/>
-          <ac:spMkLst>
-            <pc:docMk/>
-            <pc:sldMk cId="1775599074" sldId="272"/>
-            <ac:spMk id="27" creationId="{0C94B2AC-5586-4A3D-A189-1D178301C387}"/>
-          </ac:spMkLst>
-        </pc:spChg>
-        <pc:spChg chg="mod">
-          <ac:chgData name="XIONG Xin" userId="5005eae9-336c-4714-96df-1c1bef3d405b" providerId="ADAL" clId="{7517026C-8CF6-C54D-BD06-35289FFC2D04}" dt="2023-03-28T13:06:00.938" v="50" actId="1076"/>
-          <ac:spMkLst>
-            <pc:docMk/>
-            <pc:sldMk cId="1775599074" sldId="272"/>
-            <ac:spMk id="28" creationId="{187019E6-553B-456C-A632-F5BFB4F18E40}"/>
-          </ac:spMkLst>
-        </pc:spChg>
-        <pc:spChg chg="mod">
-          <ac:chgData name="XIONG Xin" userId="5005eae9-336c-4714-96df-1c1bef3d405b" providerId="ADAL" clId="{7517026C-8CF6-C54D-BD06-35289FFC2D04}" dt="2023-03-28T13:06:23.744" v="53" actId="1076"/>
-          <ac:spMkLst>
-            <pc:docMk/>
-            <pc:sldMk cId="1775599074" sldId="272"/>
-            <ac:spMk id="33" creationId="{654CEC44-76B0-480F-B2D5-AE1A78AB86D0}"/>
-          </ac:spMkLst>
-        </pc:spChg>
-        <pc:spChg chg="mod">
-          <ac:chgData name="XIONG Xin" userId="5005eae9-336c-4714-96df-1c1bef3d405b" providerId="ADAL" clId="{7517026C-8CF6-C54D-BD06-35289FFC2D04}" dt="2023-03-28T13:06:41.732" v="62" actId="1076"/>
-          <ac:spMkLst>
-            <pc:docMk/>
-            <pc:sldMk cId="1775599074" sldId="272"/>
-            <ac:spMk id="34" creationId="{6B619ABA-FBEC-4B29-BB7C-286A2E0629C6}"/>
-          </ac:spMkLst>
-        </pc:spChg>
-        <pc:spChg chg="mod">
-          <ac:chgData name="XIONG Xin" userId="5005eae9-336c-4714-96df-1c1bef3d405b" providerId="ADAL" clId="{7517026C-8CF6-C54D-BD06-35289FFC2D04}" dt="2023-03-28T13:07:59.005" v="85" actId="1076"/>
-          <ac:spMkLst>
-            <pc:docMk/>
-            <pc:sldMk cId="1775599074" sldId="272"/>
-            <ac:spMk id="36" creationId="{C125875B-5CC5-48FA-9350-DCE7B215F153}"/>
-          </ac:spMkLst>
-        </pc:spChg>
-        <pc:spChg chg="mod">
-          <ac:chgData name="XIONG Xin" userId="5005eae9-336c-4714-96df-1c1bef3d405b" providerId="ADAL" clId="{7517026C-8CF6-C54D-BD06-35289FFC2D04}" dt="2023-03-28T13:06:54.468" v="71" actId="1076"/>
-          <ac:spMkLst>
-            <pc:docMk/>
-            <pc:sldMk cId="1775599074" sldId="272"/>
-            <ac:spMk id="52" creationId="{54B0CDB6-ADF1-FC4F-D9F5-779BA0BA08FB}"/>
-          </ac:spMkLst>
-        </pc:spChg>
-        <pc:spChg chg="mod">
-          <ac:chgData name="XIONG Xin" userId="5005eae9-336c-4714-96df-1c1bef3d405b" providerId="ADAL" clId="{7517026C-8CF6-C54D-BD06-35289FFC2D04}" dt="2023-03-28T13:25:42.303" v="121" actId="1076"/>
-          <ac:spMkLst>
-            <pc:docMk/>
-            <pc:sldMk cId="1775599074" sldId="272"/>
-            <ac:spMk id="53" creationId="{515D8417-538F-9EB9-8312-7729998CDE3C}"/>
-          </ac:spMkLst>
-        </pc:spChg>
-        <pc:spChg chg="del">
-          <ac:chgData name="XIONG Xin" userId="5005eae9-336c-4714-96df-1c1bef3d405b" providerId="ADAL" clId="{7517026C-8CF6-C54D-BD06-35289FFC2D04}" dt="2023-03-28T12:58:55.900" v="10" actId="478"/>
-          <ac:spMkLst>
-            <pc:docMk/>
-            <pc:sldMk cId="1775599074" sldId="272"/>
-            <ac:spMk id="57" creationId="{EF7B47EA-0774-E65F-A4FC-42CE030D154D}"/>
-          </ac:spMkLst>
-        </pc:spChg>
-        <pc:spChg chg="del">
-          <ac:chgData name="XIONG Xin" userId="5005eae9-336c-4714-96df-1c1bef3d405b" providerId="ADAL" clId="{7517026C-8CF6-C54D-BD06-35289FFC2D04}" dt="2023-03-28T12:58:55.900" v="10" actId="478"/>
-          <ac:spMkLst>
-            <pc:docMk/>
-            <pc:sldMk cId="1775599074" sldId="272"/>
-            <ac:spMk id="73" creationId="{CA5BBFB8-C27C-EF54-9218-FE938C94CA79}"/>
-          </ac:spMkLst>
-        </pc:spChg>
-        <pc:spChg chg="mod">
-          <ac:chgData name="XIONG Xin" userId="5005eae9-336c-4714-96df-1c1bef3d405b" providerId="ADAL" clId="{7517026C-8CF6-C54D-BD06-35289FFC2D04}" dt="2023-03-28T13:03:34.181" v="32" actId="1076"/>
-          <ac:spMkLst>
-            <pc:docMk/>
-            <pc:sldMk cId="1775599074" sldId="272"/>
-            <ac:spMk id="97" creationId="{00000000-0000-0000-0000-000000000000}"/>
-          </ac:spMkLst>
-        </pc:spChg>
-        <pc:spChg chg="mod">
-          <ac:chgData name="XIONG Xin" userId="5005eae9-336c-4714-96df-1c1bef3d405b" providerId="ADAL" clId="{7517026C-8CF6-C54D-BD06-35289FFC2D04}" dt="2023-03-28T13:03:26.171" v="31" actId="1076"/>
-          <ac:spMkLst>
-            <pc:docMk/>
-            <pc:sldMk cId="1775599074" sldId="272"/>
-            <ac:spMk id="98" creationId="{00000000-0000-0000-0000-000000000000}"/>
-          </ac:spMkLst>
-        </pc:spChg>
-        <pc:spChg chg="del">
-          <ac:chgData name="XIONG Xin" userId="5005eae9-336c-4714-96df-1c1bef3d405b" providerId="ADAL" clId="{7517026C-8CF6-C54D-BD06-35289FFC2D04}" dt="2023-03-28T12:58:55.900" v="10" actId="478"/>
-          <ac:spMkLst>
-            <pc:docMk/>
-            <pc:sldMk cId="1775599074" sldId="272"/>
-            <ac:spMk id="99" creationId="{00000000-0000-0000-0000-000000000000}"/>
-          </ac:spMkLst>
-        </pc:spChg>
-        <pc:spChg chg="mod">
-          <ac:chgData name="XIONG Xin" userId="5005eae9-336c-4714-96df-1c1bef3d405b" providerId="ADAL" clId="{7517026C-8CF6-C54D-BD06-35289FFC2D04}" dt="2023-03-28T12:59:18.079" v="11" actId="1076"/>
-          <ac:spMkLst>
-            <pc:docMk/>
-            <pc:sldMk cId="1775599074" sldId="272"/>
-            <ac:spMk id="100" creationId="{00000000-0000-0000-0000-000000000000}"/>
-          </ac:spMkLst>
-        </pc:spChg>
-        <pc:spChg chg="mod">
-          <ac:chgData name="XIONG Xin" userId="5005eae9-336c-4714-96df-1c1bef3d405b" providerId="ADAL" clId="{7517026C-8CF6-C54D-BD06-35289FFC2D04}" dt="2023-03-28T13:06:00.938" v="50" actId="1076"/>
-          <ac:spMkLst>
-            <pc:docMk/>
-            <pc:sldMk cId="1775599074" sldId="272"/>
-            <ac:spMk id="101" creationId="{00000000-0000-0000-0000-000000000000}"/>
-          </ac:spMkLst>
-        </pc:spChg>
-        <pc:spChg chg="mod">
-          <ac:chgData name="XIONG Xin" userId="5005eae9-336c-4714-96df-1c1bef3d405b" providerId="ADAL" clId="{7517026C-8CF6-C54D-BD06-35289FFC2D04}" dt="2023-03-28T13:05:05.006" v="44" actId="1076"/>
-          <ac:spMkLst>
-            <pc:docMk/>
-            <pc:sldMk cId="1775599074" sldId="272"/>
-            <ac:spMk id="114" creationId="{00000000-0000-0000-0000-000000000000}"/>
-          </ac:spMkLst>
-        </pc:spChg>
-        <pc:spChg chg="mod">
-          <ac:chgData name="XIONG Xin" userId="5005eae9-336c-4714-96df-1c1bef3d405b" providerId="ADAL" clId="{7517026C-8CF6-C54D-BD06-35289FFC2D04}" dt="2023-03-28T13:05:05.006" v="44" actId="1076"/>
-          <ac:spMkLst>
-            <pc:docMk/>
-            <pc:sldMk cId="1775599074" sldId="272"/>
-            <ac:spMk id="116" creationId="{00000000-0000-0000-0000-000000000000}"/>
-          </ac:spMkLst>
-        </pc:spChg>
-        <pc:spChg chg="mod">
-          <ac:chgData name="XIONG Xin" userId="5005eae9-336c-4714-96df-1c1bef3d405b" providerId="ADAL" clId="{7517026C-8CF6-C54D-BD06-35289FFC2D04}" dt="2023-03-28T13:05:05.006" v="44" actId="1076"/>
-          <ac:spMkLst>
-            <pc:docMk/>
-            <pc:sldMk cId="1775599074" sldId="272"/>
-            <ac:spMk id="117" creationId="{00000000-0000-0000-0000-000000000000}"/>
-          </ac:spMkLst>
-        </pc:spChg>
-        <pc:spChg chg="mod">
-          <ac:chgData name="XIONG Xin" userId="5005eae9-336c-4714-96df-1c1bef3d405b" providerId="ADAL" clId="{7517026C-8CF6-C54D-BD06-35289FFC2D04}" dt="2023-03-28T13:05:05.006" v="44" actId="1076"/>
-          <ac:spMkLst>
-            <pc:docMk/>
-            <pc:sldMk cId="1775599074" sldId="272"/>
-            <ac:spMk id="119" creationId="{00000000-0000-0000-0000-000000000000}"/>
-          </ac:spMkLst>
-        </pc:spChg>
-        <pc:spChg chg="del">
-          <ac:chgData name="XIONG Xin" userId="5005eae9-336c-4714-96df-1c1bef3d405b" providerId="ADAL" clId="{7517026C-8CF6-C54D-BD06-35289FFC2D04}" dt="2023-03-28T12:58:55.900" v="10" actId="478"/>
-          <ac:spMkLst>
-            <pc:docMk/>
-            <pc:sldMk cId="1775599074" sldId="272"/>
-            <ac:spMk id="162" creationId="{0A18BB4A-6DEF-319F-F9D9-ADFC384210BF}"/>
-          </ac:spMkLst>
-        </pc:spChg>
-        <pc:spChg chg="del">
-          <ac:chgData name="XIONG Xin" userId="5005eae9-336c-4714-96df-1c1bef3d405b" providerId="ADAL" clId="{7517026C-8CF6-C54D-BD06-35289FFC2D04}" dt="2023-03-28T12:58:55.900" v="10" actId="478"/>
-          <ac:spMkLst>
-            <pc:docMk/>
-            <pc:sldMk cId="1775599074" sldId="272"/>
-            <ac:spMk id="163" creationId="{8FFB865D-9A22-B577-2CA1-506B4340B92E}"/>
-          </ac:spMkLst>
-        </pc:spChg>
-        <pc:spChg chg="del">
-          <ac:chgData name="XIONG Xin" userId="5005eae9-336c-4714-96df-1c1bef3d405b" providerId="ADAL" clId="{7517026C-8CF6-C54D-BD06-35289FFC2D04}" dt="2023-03-28T12:58:55.900" v="10" actId="478"/>
-          <ac:spMkLst>
-            <pc:docMk/>
-            <pc:sldMk cId="1775599074" sldId="272"/>
-            <ac:spMk id="164" creationId="{3B0D19D4-E5C1-CF7F-D34B-5D94B323E25B}"/>
-          </ac:spMkLst>
-        </pc:spChg>
-        <pc:spChg chg="del">
-          <ac:chgData name="XIONG Xin" userId="5005eae9-336c-4714-96df-1c1bef3d405b" providerId="ADAL" clId="{7517026C-8CF6-C54D-BD06-35289FFC2D04}" dt="2023-03-28T12:58:55.900" v="10" actId="478"/>
-          <ac:spMkLst>
-            <pc:docMk/>
-            <pc:sldMk cId="1775599074" sldId="272"/>
-            <ac:spMk id="165" creationId="{AC9A598D-D1DD-0276-0C10-2393CA4CBD6D}"/>
-          </ac:spMkLst>
-        </pc:spChg>
-        <pc:spChg chg="mod">
-          <ac:chgData name="XIONG Xin" userId="5005eae9-336c-4714-96df-1c1bef3d405b" providerId="ADAL" clId="{7517026C-8CF6-C54D-BD06-35289FFC2D04}" dt="2023-03-28T13:15:04.500" v="92" actId="20577"/>
-          <ac:spMkLst>
-            <pc:docMk/>
-            <pc:sldMk cId="1775599074" sldId="272"/>
-            <ac:spMk id="260" creationId="{3BA94CB2-2B62-D320-430C-D1004CE4B2C8}"/>
-          </ac:spMkLst>
-        </pc:spChg>
-        <pc:spChg chg="mod">
-          <ac:chgData name="XIONG Xin" userId="5005eae9-336c-4714-96df-1c1bef3d405b" providerId="ADAL" clId="{7517026C-8CF6-C54D-BD06-35289FFC2D04}" dt="2023-03-28T13:03:52.129" v="33" actId="1076"/>
-          <ac:spMkLst>
-            <pc:docMk/>
-            <pc:sldMk cId="1775599074" sldId="272"/>
-            <ac:spMk id="268" creationId="{618820F0-0841-877A-5DD7-FFAD622614A5}"/>
-          </ac:spMkLst>
-        </pc:spChg>
-        <pc:spChg chg="mod">
-          <ac:chgData name="XIONG Xin" userId="5005eae9-336c-4714-96df-1c1bef3d405b" providerId="ADAL" clId="{7517026C-8CF6-C54D-BD06-35289FFC2D04}" dt="2023-03-28T13:03:52.129" v="33" actId="1076"/>
-          <ac:spMkLst>
-            <pc:docMk/>
-            <pc:sldMk cId="1775599074" sldId="272"/>
-            <ac:spMk id="270" creationId="{5118BF8E-BDD8-484D-E49D-ED307B7EA0C5}"/>
-          </ac:spMkLst>
-        </pc:spChg>
-        <pc:spChg chg="mod">
-          <ac:chgData name="XIONG Xin" userId="5005eae9-336c-4714-96df-1c1bef3d405b" providerId="ADAL" clId="{7517026C-8CF6-C54D-BD06-35289FFC2D04}" dt="2023-03-28T13:03:52.129" v="33" actId="1076"/>
-          <ac:spMkLst>
-            <pc:docMk/>
-            <pc:sldMk cId="1775599074" sldId="272"/>
-            <ac:spMk id="272" creationId="{7CD81458-222C-EA5A-BAF3-913091042BB4}"/>
-          </ac:spMkLst>
-        </pc:spChg>
-        <pc:spChg chg="mod">
-          <ac:chgData name="XIONG Xin" userId="5005eae9-336c-4714-96df-1c1bef3d405b" providerId="ADAL" clId="{7517026C-8CF6-C54D-BD06-35289FFC2D04}" dt="2023-03-28T13:03:52.129" v="33" actId="1076"/>
-          <ac:spMkLst>
-            <pc:docMk/>
-            <pc:sldMk cId="1775599074" sldId="272"/>
-            <ac:spMk id="273" creationId="{52F94505-1373-5A19-A3E9-599E828F5D9C}"/>
-          </ac:spMkLst>
-        </pc:spChg>
-        <pc:spChg chg="mod">
-          <ac:chgData name="XIONG Xin" userId="5005eae9-336c-4714-96df-1c1bef3d405b" providerId="ADAL" clId="{7517026C-8CF6-C54D-BD06-35289FFC2D04}" dt="2023-03-28T13:18:26.123" v="94" actId="14100"/>
-          <ac:spMkLst>
-            <pc:docMk/>
-            <pc:sldMk cId="1775599074" sldId="272"/>
-            <ac:spMk id="283" creationId="{00000000-0000-0000-0000-000000000000}"/>
-          </ac:spMkLst>
-        </pc:spChg>
-        <pc:spChg chg="mod">
-          <ac:chgData name="XIONG Xin" userId="5005eae9-336c-4714-96df-1c1bef3d405b" providerId="ADAL" clId="{7517026C-8CF6-C54D-BD06-35289FFC2D04}" dt="2023-03-28T13:18:36.842" v="95" actId="1076"/>
-          <ac:spMkLst>
-            <pc:docMk/>
-            <pc:sldMk cId="1775599074" sldId="272"/>
-            <ac:spMk id="284" creationId="{00000000-0000-0000-0000-000000000000}"/>
-          </ac:spMkLst>
-        </pc:spChg>
-        <pc:spChg chg="mod">
-          <ac:chgData name="XIONG Xin" userId="5005eae9-336c-4714-96df-1c1bef3d405b" providerId="ADAL" clId="{7517026C-8CF6-C54D-BD06-35289FFC2D04}" dt="2023-03-28T13:06:00.938" v="50" actId="1076"/>
-          <ac:spMkLst>
-            <pc:docMk/>
-            <pc:sldMk cId="1775599074" sldId="272"/>
-            <ac:spMk id="285" creationId="{00000000-0000-0000-0000-000000000000}"/>
-          </ac:spMkLst>
-        </pc:spChg>
-        <pc:spChg chg="mod">
-          <ac:chgData name="XIONG Xin" userId="5005eae9-336c-4714-96df-1c1bef3d405b" providerId="ADAL" clId="{7517026C-8CF6-C54D-BD06-35289FFC2D04}" dt="2023-03-28T13:02:18.030" v="26" actId="1076"/>
-          <ac:spMkLst>
-            <pc:docMk/>
-            <pc:sldMk cId="1775599074" sldId="272"/>
-            <ac:spMk id="319" creationId="{47BDB519-B364-100A-FA7D-0B612A4647A6}"/>
-          </ac:spMkLst>
-        </pc:spChg>
-        <pc:spChg chg="mod">
-          <ac:chgData name="XIONG Xin" userId="5005eae9-336c-4714-96df-1c1bef3d405b" providerId="ADAL" clId="{7517026C-8CF6-C54D-BD06-35289FFC2D04}" dt="2023-03-28T13:02:18.030" v="26" actId="1076"/>
-          <ac:spMkLst>
-            <pc:docMk/>
-            <pc:sldMk cId="1775599074" sldId="272"/>
-            <ac:spMk id="320" creationId="{D06DB1A0-7F1E-D104-3726-1A312D2C6D31}"/>
-          </ac:spMkLst>
-        </pc:spChg>
-        <pc:spChg chg="mod">
-          <ac:chgData name="XIONG Xin" userId="5005eae9-336c-4714-96df-1c1bef3d405b" providerId="ADAL" clId="{7517026C-8CF6-C54D-BD06-35289FFC2D04}" dt="2023-03-28T13:02:18.030" v="26" actId="1076"/>
-          <ac:spMkLst>
-            <pc:docMk/>
-            <pc:sldMk cId="1775599074" sldId="272"/>
-            <ac:spMk id="321" creationId="{AB2EFBD7-6F14-F7AA-AFEF-DCAD6A7502A9}"/>
-          </ac:spMkLst>
-        </pc:spChg>
-        <pc:spChg chg="mod">
-          <ac:chgData name="XIONG Xin" userId="5005eae9-336c-4714-96df-1c1bef3d405b" providerId="ADAL" clId="{7517026C-8CF6-C54D-BD06-35289FFC2D04}" dt="2023-03-28T13:02:18.030" v="26" actId="1076"/>
-          <ac:spMkLst>
-            <pc:docMk/>
-            <pc:sldMk cId="1775599074" sldId="272"/>
-            <ac:spMk id="322" creationId="{3F3C146D-6CCD-9760-2E70-1D44E3293789}"/>
-          </ac:spMkLst>
-        </pc:spChg>
-        <pc:picChg chg="del">
-          <ac:chgData name="XIONG Xin" userId="5005eae9-336c-4714-96df-1c1bef3d405b" providerId="ADAL" clId="{7517026C-8CF6-C54D-BD06-35289FFC2D04}" dt="2023-03-28T12:58:40.622" v="9" actId="478"/>
-          <ac:picMkLst>
-            <pc:docMk/>
-            <pc:sldMk cId="1775599074" sldId="272"/>
-            <ac:picMk id="145" creationId="{E4201288-E7CD-3D67-5EE4-BBD68D6ECA78}"/>
-          </ac:picMkLst>
-        </pc:picChg>
-        <pc:cxnChg chg="mod">
-          <ac:chgData name="XIONG Xin" userId="5005eae9-336c-4714-96df-1c1bef3d405b" providerId="ADAL" clId="{7517026C-8CF6-C54D-BD06-35289FFC2D04}" dt="2023-03-28T13:15:30.170" v="93" actId="1037"/>
-          <ac:cxnSpMkLst>
-            <pc:docMk/>
-            <pc:sldMk cId="1775599074" sldId="272"/>
-            <ac:cxnSpMk id="29" creationId="{E488F9A4-3B3A-4889-B737-5F24B8E0A199}"/>
-          </ac:cxnSpMkLst>
-        </pc:cxnChg>
-        <pc:cxnChg chg="mod">
-          <ac:chgData name="XIONG Xin" userId="5005eae9-336c-4714-96df-1c1bef3d405b" providerId="ADAL" clId="{7517026C-8CF6-C54D-BD06-35289FFC2D04}" dt="2023-03-28T13:03:52.129" v="33" actId="1076"/>
-          <ac:cxnSpMkLst>
-            <pc:docMk/>
-            <pc:sldMk cId="1775599074" sldId="272"/>
-            <ac:cxnSpMk id="30" creationId="{53B39DA2-5082-4479-A08A-682A5F86AADA}"/>
-          </ac:cxnSpMkLst>
-        </pc:cxnChg>
-        <pc:cxnChg chg="mod">
-          <ac:chgData name="XIONG Xin" userId="5005eae9-336c-4714-96df-1c1bef3d405b" providerId="ADAL" clId="{7517026C-8CF6-C54D-BD06-35289FFC2D04}" dt="2023-03-28T13:02:18.030" v="26" actId="1076"/>
-          <ac:cxnSpMkLst>
-            <pc:docMk/>
-            <pc:sldMk cId="1775599074" sldId="272"/>
-            <ac:cxnSpMk id="31" creationId="{F14A77D5-CDF1-44B2-A689-292EC312277B}"/>
-          </ac:cxnSpMkLst>
-        </pc:cxnChg>
-        <pc:cxnChg chg="del mod">
-          <ac:chgData name="XIONG Xin" userId="5005eae9-336c-4714-96df-1c1bef3d405b" providerId="ADAL" clId="{7517026C-8CF6-C54D-BD06-35289FFC2D04}" dt="2023-03-28T12:58:55.900" v="10" actId="478"/>
-          <ac:cxnSpMkLst>
-            <pc:docMk/>
-            <pc:sldMk cId="1775599074" sldId="272"/>
-            <ac:cxnSpMk id="32" creationId="{F4EABDDA-D041-4BFC-B6D5-25CCC154AFFE}"/>
-          </ac:cxnSpMkLst>
-        </pc:cxnChg>
-        <pc:cxnChg chg="mod">
-          <ac:chgData name="XIONG Xin" userId="5005eae9-336c-4714-96df-1c1bef3d405b" providerId="ADAL" clId="{7517026C-8CF6-C54D-BD06-35289FFC2D04}" dt="2023-03-28T13:03:34.181" v="32" actId="1076"/>
-          <ac:cxnSpMkLst>
-            <pc:docMk/>
-            <pc:sldMk cId="1775599074" sldId="272"/>
-            <ac:cxnSpMk id="37" creationId="{00000000-0000-0000-0000-000000000000}"/>
-          </ac:cxnSpMkLst>
-        </pc:cxnChg>
-        <pc:cxnChg chg="mod">
-          <ac:chgData name="XIONG Xin" userId="5005eae9-336c-4714-96df-1c1bef3d405b" providerId="ADAL" clId="{7517026C-8CF6-C54D-BD06-35289FFC2D04}" dt="2023-03-28T13:05:41.888" v="49" actId="1037"/>
-          <ac:cxnSpMkLst>
-            <pc:docMk/>
-            <pc:sldMk cId="1775599074" sldId="272"/>
-            <ac:cxnSpMk id="40" creationId="{00000000-0000-0000-0000-000000000000}"/>
-          </ac:cxnSpMkLst>
-        </pc:cxnChg>
-        <pc:cxnChg chg="mod">
-          <ac:chgData name="XIONG Xin" userId="5005eae9-336c-4714-96df-1c1bef3d405b" providerId="ADAL" clId="{7517026C-8CF6-C54D-BD06-35289FFC2D04}" dt="2023-03-28T13:05:36.789" v="48" actId="1037"/>
-          <ac:cxnSpMkLst>
-            <pc:docMk/>
-            <pc:sldMk cId="1775599074" sldId="272"/>
-            <ac:cxnSpMk id="41" creationId="{00000000-0000-0000-0000-000000000000}"/>
-          </ac:cxnSpMkLst>
-        </pc:cxnChg>
-        <pc:cxnChg chg="mod">
-          <ac:chgData name="XIONG Xin" userId="5005eae9-336c-4714-96df-1c1bef3d405b" providerId="ADAL" clId="{7517026C-8CF6-C54D-BD06-35289FFC2D04}" dt="2023-03-28T13:15:30.170" v="93" actId="1037"/>
-          <ac:cxnSpMkLst>
-            <pc:docMk/>
-            <pc:sldMk cId="1775599074" sldId="272"/>
-            <ac:cxnSpMk id="54" creationId="{00000000-0000-0000-0000-000000000000}"/>
-          </ac:cxnSpMkLst>
-        </pc:cxnChg>
-        <pc:cxnChg chg="mod">
-          <ac:chgData name="XIONG Xin" userId="5005eae9-336c-4714-96df-1c1bef3d405b" providerId="ADAL" clId="{7517026C-8CF6-C54D-BD06-35289FFC2D04}" dt="2023-03-28T13:05:36.789" v="48" actId="1037"/>
-          <ac:cxnSpMkLst>
-            <pc:docMk/>
-            <pc:sldMk cId="1775599074" sldId="272"/>
-            <ac:cxnSpMk id="55" creationId="{00000000-0000-0000-0000-000000000000}"/>
-          </ac:cxnSpMkLst>
-        </pc:cxnChg>
-        <pc:cxnChg chg="mod">
-          <ac:chgData name="XIONG Xin" userId="5005eae9-336c-4714-96df-1c1bef3d405b" providerId="ADAL" clId="{7517026C-8CF6-C54D-BD06-35289FFC2D04}" dt="2023-03-28T13:05:41.888" v="49" actId="1037"/>
-          <ac:cxnSpMkLst>
-            <pc:docMk/>
-            <pc:sldMk cId="1775599074" sldId="272"/>
-            <ac:cxnSpMk id="56" creationId="{00000000-0000-0000-0000-000000000000}"/>
-          </ac:cxnSpMkLst>
-        </pc:cxnChg>
-        <pc:cxnChg chg="mod">
-          <ac:chgData name="XIONG Xin" userId="5005eae9-336c-4714-96df-1c1bef3d405b" providerId="ADAL" clId="{7517026C-8CF6-C54D-BD06-35289FFC2D04}" dt="2023-03-28T13:03:34.181" v="32" actId="1076"/>
-          <ac:cxnSpMkLst>
-            <pc:docMk/>
-            <pc:sldMk cId="1775599074" sldId="272"/>
-            <ac:cxnSpMk id="59" creationId="{00000000-0000-0000-0000-000000000000}"/>
-          </ac:cxnSpMkLst>
-        </pc:cxnChg>
-        <pc:cxnChg chg="mod">
-          <ac:chgData name="XIONG Xin" userId="5005eae9-336c-4714-96df-1c1bef3d405b" providerId="ADAL" clId="{7517026C-8CF6-C54D-BD06-35289FFC2D04}" dt="2023-03-28T13:03:52.129" v="33" actId="1076"/>
-          <ac:cxnSpMkLst>
-            <pc:docMk/>
-            <pc:sldMk cId="1775599074" sldId="272"/>
-            <ac:cxnSpMk id="60" creationId="{00000000-0000-0000-0000-000000000000}"/>
-          </ac:cxnSpMkLst>
-        </pc:cxnChg>
-        <pc:cxnChg chg="mod">
-          <ac:chgData name="XIONG Xin" userId="5005eae9-336c-4714-96df-1c1bef3d405b" providerId="ADAL" clId="{7517026C-8CF6-C54D-BD06-35289FFC2D04}" dt="2023-03-28T13:03:52.129" v="33" actId="1076"/>
-          <ac:cxnSpMkLst>
-            <pc:docMk/>
-            <pc:sldMk cId="1775599074" sldId="272"/>
-            <ac:cxnSpMk id="63" creationId="{00000000-0000-0000-0000-000000000000}"/>
-          </ac:cxnSpMkLst>
-        </pc:cxnChg>
-        <pc:cxnChg chg="mod">
-          <ac:chgData name="XIONG Xin" userId="5005eae9-336c-4714-96df-1c1bef3d405b" providerId="ADAL" clId="{7517026C-8CF6-C54D-BD06-35289FFC2D04}" dt="2023-03-28T13:03:52.129" v="33" actId="1076"/>
-          <ac:cxnSpMkLst>
-            <pc:docMk/>
-            <pc:sldMk cId="1775599074" sldId="272"/>
-            <ac:cxnSpMk id="66" creationId="{00000000-0000-0000-0000-000000000000}"/>
-          </ac:cxnSpMkLst>
-        </pc:cxnChg>
-        <pc:cxnChg chg="mod">
-          <ac:chgData name="XIONG Xin" userId="5005eae9-336c-4714-96df-1c1bef3d405b" providerId="ADAL" clId="{7517026C-8CF6-C54D-BD06-35289FFC2D04}" dt="2023-03-28T13:02:18.030" v="26" actId="1076"/>
-          <ac:cxnSpMkLst>
-            <pc:docMk/>
-            <pc:sldMk cId="1775599074" sldId="272"/>
-            <ac:cxnSpMk id="68" creationId="{00000000-0000-0000-0000-000000000000}"/>
-          </ac:cxnSpMkLst>
-        </pc:cxnChg>
-        <pc:cxnChg chg="mod">
-          <ac:chgData name="XIONG Xin" userId="5005eae9-336c-4714-96df-1c1bef3d405b" providerId="ADAL" clId="{7517026C-8CF6-C54D-BD06-35289FFC2D04}" dt="2023-03-28T13:02:18.030" v="26" actId="1076"/>
-          <ac:cxnSpMkLst>
-            <pc:docMk/>
-            <pc:sldMk cId="1775599074" sldId="272"/>
-            <ac:cxnSpMk id="71" creationId="{00000000-0000-0000-0000-000000000000}"/>
-          </ac:cxnSpMkLst>
-        </pc:cxnChg>
-        <pc:cxnChg chg="mod">
-          <ac:chgData name="XIONG Xin" userId="5005eae9-336c-4714-96df-1c1bef3d405b" providerId="ADAL" clId="{7517026C-8CF6-C54D-BD06-35289FFC2D04}" dt="2023-03-28T13:02:18.030" v="26" actId="1076"/>
-          <ac:cxnSpMkLst>
-            <pc:docMk/>
-            <pc:sldMk cId="1775599074" sldId="272"/>
-            <ac:cxnSpMk id="72" creationId="{00000000-0000-0000-0000-000000000000}"/>
-          </ac:cxnSpMkLst>
-        </pc:cxnChg>
-        <pc:cxnChg chg="del mod">
-          <ac:chgData name="XIONG Xin" userId="5005eae9-336c-4714-96df-1c1bef3d405b" providerId="ADAL" clId="{7517026C-8CF6-C54D-BD06-35289FFC2D04}" dt="2023-03-28T12:58:55.900" v="10" actId="478"/>
-          <ac:cxnSpMkLst>
-            <pc:docMk/>
-            <pc:sldMk cId="1775599074" sldId="272"/>
-            <ac:cxnSpMk id="75" creationId="{00000000-0000-0000-0000-000000000000}"/>
-          </ac:cxnSpMkLst>
-        </pc:cxnChg>
-        <pc:cxnChg chg="del mod">
-          <ac:chgData name="XIONG Xin" userId="5005eae9-336c-4714-96df-1c1bef3d405b" providerId="ADAL" clId="{7517026C-8CF6-C54D-BD06-35289FFC2D04}" dt="2023-03-28T13:04:04.250" v="35" actId="478"/>
-          <ac:cxnSpMkLst>
-            <pc:docMk/>
-            <pc:sldMk cId="1775599074" sldId="272"/>
-            <ac:cxnSpMk id="90" creationId="{00000000-0000-0000-0000-000000000000}"/>
-          </ac:cxnSpMkLst>
-        </pc:cxnChg>
-        <pc:cxnChg chg="del mod">
-          <ac:chgData name="XIONG Xin" userId="5005eae9-336c-4714-96df-1c1bef3d405b" providerId="ADAL" clId="{7517026C-8CF6-C54D-BD06-35289FFC2D04}" dt="2023-03-28T12:58:55.900" v="10" actId="478"/>
-          <ac:cxnSpMkLst>
-            <pc:docMk/>
-            <pc:sldMk cId="1775599074" sldId="272"/>
-            <ac:cxnSpMk id="124" creationId="{00000000-0000-0000-0000-000000000000}"/>
-          </ac:cxnSpMkLst>
-        </pc:cxnChg>
-        <pc:cxnChg chg="del mod">
-          <ac:chgData name="XIONG Xin" userId="5005eae9-336c-4714-96df-1c1bef3d405b" providerId="ADAL" clId="{7517026C-8CF6-C54D-BD06-35289FFC2D04}" dt="2023-03-28T12:58:55.900" v="10" actId="478"/>
-          <ac:cxnSpMkLst>
-            <pc:docMk/>
-            <pc:sldMk cId="1775599074" sldId="272"/>
-            <ac:cxnSpMk id="139" creationId="{00000000-0000-0000-0000-000000000000}"/>
-          </ac:cxnSpMkLst>
-        </pc:cxnChg>
-        <pc:cxnChg chg="mod">
-          <ac:chgData name="XIONG Xin" userId="5005eae9-336c-4714-96df-1c1bef3d405b" providerId="ADAL" clId="{7517026C-8CF6-C54D-BD06-35289FFC2D04}" dt="2023-03-28T13:06:00.938" v="50" actId="1076"/>
-          <ac:cxnSpMkLst>
-            <pc:docMk/>
-            <pc:sldMk cId="1775599074" sldId="272"/>
-            <ac:cxnSpMk id="142" creationId="{00000000-0000-0000-0000-000000000000}"/>
-          </ac:cxnSpMkLst>
-        </pc:cxnChg>
-        <pc:cxnChg chg="mod">
-          <ac:chgData name="XIONG Xin" userId="5005eae9-336c-4714-96df-1c1bef3d405b" providerId="ADAL" clId="{7517026C-8CF6-C54D-BD06-35289FFC2D04}" dt="2023-03-28T13:06:00.938" v="50" actId="1076"/>
-          <ac:cxnSpMkLst>
-            <pc:docMk/>
-            <pc:sldMk cId="1775599074" sldId="272"/>
-            <ac:cxnSpMk id="143" creationId="{00000000-0000-0000-0000-000000000000}"/>
-          </ac:cxnSpMkLst>
-        </pc:cxnChg>
-        <pc:cxnChg chg="mod">
-          <ac:chgData name="XIONG Xin" userId="5005eae9-336c-4714-96df-1c1bef3d405b" providerId="ADAL" clId="{7517026C-8CF6-C54D-BD06-35289FFC2D04}" dt="2023-03-28T13:06:00.938" v="50" actId="1076"/>
-          <ac:cxnSpMkLst>
-            <pc:docMk/>
-            <pc:sldMk cId="1775599074" sldId="272"/>
-            <ac:cxnSpMk id="152" creationId="{00000000-0000-0000-0000-000000000000}"/>
-          </ac:cxnSpMkLst>
-        </pc:cxnChg>
-        <pc:cxnChg chg="mod">
-          <ac:chgData name="XIONG Xin" userId="5005eae9-336c-4714-96df-1c1bef3d405b" providerId="ADAL" clId="{7517026C-8CF6-C54D-BD06-35289FFC2D04}" dt="2023-03-28T13:06:00.938" v="50" actId="1076"/>
-          <ac:cxnSpMkLst>
-            <pc:docMk/>
-            <pc:sldMk cId="1775599074" sldId="272"/>
-            <ac:cxnSpMk id="153" creationId="{00000000-0000-0000-0000-000000000000}"/>
-          </ac:cxnSpMkLst>
-        </pc:cxnChg>
-        <pc:cxnChg chg="mod">
-          <ac:chgData name="XIONG Xin" userId="5005eae9-336c-4714-96df-1c1bef3d405b" providerId="ADAL" clId="{7517026C-8CF6-C54D-BD06-35289FFC2D04}" dt="2023-03-28T13:05:05.006" v="44" actId="1076"/>
-          <ac:cxnSpMkLst>
-            <pc:docMk/>
-            <pc:sldMk cId="1775599074" sldId="272"/>
-            <ac:cxnSpMk id="184" creationId="{E6F83AE0-7ED0-86B1-87FB-9E24A5764772}"/>
-          </ac:cxnSpMkLst>
-        </pc:cxnChg>
-        <pc:cxnChg chg="mod">
-          <ac:chgData name="XIONG Xin" userId="5005eae9-336c-4714-96df-1c1bef3d405b" providerId="ADAL" clId="{7517026C-8CF6-C54D-BD06-35289FFC2D04}" dt="2023-03-28T13:05:05.006" v="44" actId="1076"/>
-          <ac:cxnSpMkLst>
-            <pc:docMk/>
-            <pc:sldMk cId="1775599074" sldId="272"/>
-            <ac:cxnSpMk id="187" creationId="{F4EABDDA-D041-4BFC-B6D5-25CCC154AFFE}"/>
-          </ac:cxnSpMkLst>
-        </pc:cxnChg>
-        <pc:cxnChg chg="mod">
-          <ac:chgData name="XIONG Xin" userId="5005eae9-336c-4714-96df-1c1bef3d405b" providerId="ADAL" clId="{7517026C-8CF6-C54D-BD06-35289FFC2D04}" dt="2023-03-28T13:05:05.006" v="44" actId="1076"/>
-          <ac:cxnSpMkLst>
-            <pc:docMk/>
-            <pc:sldMk cId="1775599074" sldId="272"/>
-            <ac:cxnSpMk id="190" creationId="{F4EABDDA-D041-4BFC-B6D5-25CCC154AFFE}"/>
-          </ac:cxnSpMkLst>
-        </pc:cxnChg>
-        <pc:cxnChg chg="mod">
-          <ac:chgData name="XIONG Xin" userId="5005eae9-336c-4714-96df-1c1bef3d405b" providerId="ADAL" clId="{7517026C-8CF6-C54D-BD06-35289FFC2D04}" dt="2023-03-28T13:05:05.006" v="44" actId="1076"/>
-          <ac:cxnSpMkLst>
-            <pc:docMk/>
-            <pc:sldMk cId="1775599074" sldId="272"/>
-            <ac:cxnSpMk id="257" creationId="{F4EABDDA-D041-4BFC-B6D5-25CCC154AFFE}"/>
-          </ac:cxnSpMkLst>
-        </pc:cxnChg>
-        <pc:cxnChg chg="mod">
-          <ac:chgData name="XIONG Xin" userId="5005eae9-336c-4714-96df-1c1bef3d405b" providerId="ADAL" clId="{7517026C-8CF6-C54D-BD06-35289FFC2D04}" dt="2023-03-28T13:03:52.129" v="33" actId="1076"/>
-          <ac:cxnSpMkLst>
-            <pc:docMk/>
-            <pc:sldMk cId="1775599074" sldId="272"/>
-            <ac:cxnSpMk id="323" creationId="{A4D124D0-FF9F-6BF7-C2E5-51D43EA2BB0B}"/>
-          </ac:cxnSpMkLst>
-        </pc:cxnChg>
-        <pc:cxnChg chg="mod">
-          <ac:chgData name="XIONG Xin" userId="5005eae9-336c-4714-96df-1c1bef3d405b" providerId="ADAL" clId="{7517026C-8CF6-C54D-BD06-35289FFC2D04}" dt="2023-03-28T13:03:52.129" v="33" actId="1076"/>
-          <ac:cxnSpMkLst>
-            <pc:docMk/>
-            <pc:sldMk cId="1775599074" sldId="272"/>
-            <ac:cxnSpMk id="327" creationId="{4D95FEFC-98BC-5556-5592-25F60862F9CC}"/>
-          </ac:cxnSpMkLst>
-        </pc:cxnChg>
-        <pc:cxnChg chg="mod">
-          <ac:chgData name="XIONG Xin" userId="5005eae9-336c-4714-96df-1c1bef3d405b" providerId="ADAL" clId="{7517026C-8CF6-C54D-BD06-35289FFC2D04}" dt="2023-03-28T13:03:52.129" v="33" actId="1076"/>
-          <ac:cxnSpMkLst>
-            <pc:docMk/>
-            <pc:sldMk cId="1775599074" sldId="272"/>
-            <ac:cxnSpMk id="330" creationId="{A4D124D0-FF9F-6BF7-C2E5-51D43EA2BB0B}"/>
-          </ac:cxnSpMkLst>
-        </pc:cxnChg>
-        <pc:cxnChg chg="mod">
-          <ac:chgData name="XIONG Xin" userId="5005eae9-336c-4714-96df-1c1bef3d405b" providerId="ADAL" clId="{7517026C-8CF6-C54D-BD06-35289FFC2D04}" dt="2023-03-28T13:03:52.129" v="33" actId="1076"/>
-          <ac:cxnSpMkLst>
-            <pc:docMk/>
-            <pc:sldMk cId="1775599074" sldId="272"/>
-            <ac:cxnSpMk id="333" creationId="{A4D124D0-FF9F-6BF7-C2E5-51D43EA2BB0B}"/>
-          </ac:cxnSpMkLst>
-        </pc:cxnChg>
-        <pc:cxnChg chg="del mod">
-          <ac:chgData name="XIONG Xin" userId="5005eae9-336c-4714-96df-1c1bef3d405b" providerId="ADAL" clId="{7517026C-8CF6-C54D-BD06-35289FFC2D04}" dt="2023-03-28T13:04:06.356" v="37" actId="478"/>
-          <ac:cxnSpMkLst>
-            <pc:docMk/>
-            <pc:sldMk cId="1775599074" sldId="272"/>
-            <ac:cxnSpMk id="390" creationId="{CF5E2BA7-395F-6FC0-63F0-D2805FB916DD}"/>
-          </ac:cxnSpMkLst>
-        </pc:cxnChg>
-        <pc:cxnChg chg="del mod">
-          <ac:chgData name="XIONG Xin" userId="5005eae9-336c-4714-96df-1c1bef3d405b" providerId="ADAL" clId="{7517026C-8CF6-C54D-BD06-35289FFC2D04}" dt="2023-03-28T13:04:03.181" v="34" actId="478"/>
-          <ac:cxnSpMkLst>
-            <pc:docMk/>
-            <pc:sldMk cId="1775599074" sldId="272"/>
-            <ac:cxnSpMk id="395" creationId="{1554EAA2-0EF0-60A6-5CEE-294D66B187FD}"/>
-          </ac:cxnSpMkLst>
-        </pc:cxnChg>
-        <pc:cxnChg chg="del mod">
-          <ac:chgData name="XIONG Xin" userId="5005eae9-336c-4714-96df-1c1bef3d405b" providerId="ADAL" clId="{7517026C-8CF6-C54D-BD06-35289FFC2D04}" dt="2023-03-28T13:04:05.455" v="36" actId="478"/>
-          <ac:cxnSpMkLst>
-            <pc:docMk/>
-            <pc:sldMk cId="1775599074" sldId="272"/>
             <ac:cxnSpMk id="398" creationId="{DE50CC46-A0D0-C32E-679C-BC945F624D2A}"/>
           </ac:cxnSpMkLst>
         </pc:cxnChg>
@@ -7772,7 +7772,7 @@
           <a:p>
             <a:fld id="{FC01C561-3193-7949-89BE-75313C5345B7}" type="datetimeFigureOut">
               <a:rPr lang="en-US" smtClean="0"/>
-              <a:t>3/28/23</a:t>
+              <a:t>11/13/23</a:t>
             </a:fld>
             <a:endParaRPr lang="en-US"/>
           </a:p>
@@ -8260,7 +8260,7 @@
           <a:p>
             <a:fld id="{3709397E-26E2-4571-B0E6-05A65F5EC869}" type="datetimeFigureOut">
               <a:rPr lang="zh-CN" altLang="en-US" smtClean="0"/>
-              <a:t>2023/3/28</a:t>
+              <a:t>2023/11/13</a:t>
             </a:fld>
             <a:endParaRPr lang="zh-CN" altLang="en-US"/>
           </a:p>
@@ -8430,7 +8430,7 @@
           <a:p>
             <a:fld id="{3709397E-26E2-4571-B0E6-05A65F5EC869}" type="datetimeFigureOut">
               <a:rPr lang="zh-CN" altLang="en-US" smtClean="0"/>
-              <a:t>2023/3/28</a:t>
+              <a:t>2023/11/13</a:t>
             </a:fld>
             <a:endParaRPr lang="zh-CN" altLang="en-US"/>
           </a:p>
@@ -8610,7 +8610,7 @@
           <a:p>
             <a:fld id="{3709397E-26E2-4571-B0E6-05A65F5EC869}" type="datetimeFigureOut">
               <a:rPr lang="zh-CN" altLang="en-US" smtClean="0"/>
-              <a:t>2023/3/28</a:t>
+              <a:t>2023/11/13</a:t>
             </a:fld>
             <a:endParaRPr lang="zh-CN" altLang="en-US"/>
           </a:p>
@@ -8780,7 +8780,7 @@
           <a:p>
             <a:fld id="{3709397E-26E2-4571-B0E6-05A65F5EC869}" type="datetimeFigureOut">
               <a:rPr lang="zh-CN" altLang="en-US" smtClean="0"/>
-              <a:t>2023/3/28</a:t>
+              <a:t>2023/11/13</a:t>
             </a:fld>
             <a:endParaRPr lang="zh-CN" altLang="en-US"/>
           </a:p>
@@ -9024,7 +9024,7 @@
           <a:p>
             <a:fld id="{3709397E-26E2-4571-B0E6-05A65F5EC869}" type="datetimeFigureOut">
               <a:rPr lang="zh-CN" altLang="en-US" smtClean="0"/>
-              <a:t>2023/3/28</a:t>
+              <a:t>2023/11/13</a:t>
             </a:fld>
             <a:endParaRPr lang="zh-CN" altLang="en-US"/>
           </a:p>
@@ -9256,7 +9256,7 @@
           <a:p>
             <a:fld id="{3709397E-26E2-4571-B0E6-05A65F5EC869}" type="datetimeFigureOut">
               <a:rPr lang="zh-CN" altLang="en-US" smtClean="0"/>
-              <a:t>2023/3/28</a:t>
+              <a:t>2023/11/13</a:t>
             </a:fld>
             <a:endParaRPr lang="zh-CN" altLang="en-US"/>
           </a:p>
@@ -9623,7 +9623,7 @@
           <a:p>
             <a:fld id="{3709397E-26E2-4571-B0E6-05A65F5EC869}" type="datetimeFigureOut">
               <a:rPr lang="zh-CN" altLang="en-US" smtClean="0"/>
-              <a:t>2023/3/28</a:t>
+              <a:t>2023/11/13</a:t>
             </a:fld>
             <a:endParaRPr lang="zh-CN" altLang="en-US"/>
           </a:p>
@@ -9741,7 +9741,7 @@
           <a:p>
             <a:fld id="{3709397E-26E2-4571-B0E6-05A65F5EC869}" type="datetimeFigureOut">
               <a:rPr lang="zh-CN" altLang="en-US" smtClean="0"/>
-              <a:t>2023/3/28</a:t>
+              <a:t>2023/11/13</a:t>
             </a:fld>
             <a:endParaRPr lang="zh-CN" altLang="en-US"/>
           </a:p>
@@ -9836,7 +9836,7 @@
           <a:p>
             <a:fld id="{3709397E-26E2-4571-B0E6-05A65F5EC869}" type="datetimeFigureOut">
               <a:rPr lang="zh-CN" altLang="en-US" smtClean="0"/>
-              <a:t>2023/3/28</a:t>
+              <a:t>2023/11/13</a:t>
             </a:fld>
             <a:endParaRPr lang="zh-CN" altLang="en-US"/>
           </a:p>
@@ -10113,7 +10113,7 @@
           <a:p>
             <a:fld id="{3709397E-26E2-4571-B0E6-05A65F5EC869}" type="datetimeFigureOut">
               <a:rPr lang="zh-CN" altLang="en-US" smtClean="0"/>
-              <a:t>2023/3/28</a:t>
+              <a:t>2023/11/13</a:t>
             </a:fld>
             <a:endParaRPr lang="zh-CN" altLang="en-US"/>
           </a:p>
@@ -10370,7 +10370,7 @@
           <a:p>
             <a:fld id="{3709397E-26E2-4571-B0E6-05A65F5EC869}" type="datetimeFigureOut">
               <a:rPr lang="zh-CN" altLang="en-US" smtClean="0"/>
-              <a:t>2023/3/28</a:t>
+              <a:t>2023/11/13</a:t>
             </a:fld>
             <a:endParaRPr lang="zh-CN" altLang="en-US"/>
           </a:p>
@@ -10583,7 +10583,7 @@
           <a:p>
             <a:fld id="{3709397E-26E2-4571-B0E6-05A65F5EC869}" type="datetimeFigureOut">
               <a:rPr lang="zh-CN" altLang="en-US" smtClean="0"/>
-              <a:t>2023/3/28</a:t>
+              <a:t>2023/11/13</a:t>
             </a:fld>
             <a:endParaRPr lang="zh-CN" altLang="en-US"/>
           </a:p>
@@ -11023,13 +11023,13 @@
                 <a:ea typeface="楷体" panose="02010609060101010101" pitchFamily="49" charset="-122"/>
                 <a:cs typeface="Arial" panose="020B0604020202020204" pitchFamily="34" charset="0"/>
               </a:rPr>
-              <a:t>Input layer: ~6000D</a:t>
+              <a:t>Input layer: ~9,000D</a:t>
             </a:r>
           </a:p>
         </p:txBody>
       </p:sp>
-      <mc:AlternateContent xmlns:mc="http://schemas.openxmlformats.org/markup-compatibility/2006">
-        <mc:Choice xmlns:a14="http://schemas.microsoft.com/office/drawing/2010/main" Requires="a14">
+      <mc:AlternateContent xmlns:mc="http://schemas.openxmlformats.org/markup-compatibility/2006" xmlns:a14="http://schemas.microsoft.com/office/drawing/2010/main">
+        <mc:Choice Requires="a14">
           <p:sp>
             <p:nvSpPr>
               <p:cNvPr id="6" name="椭圆 5">
@@ -11080,7 +11080,7 @@
                       <m:sSub>
                         <m:sSubPr>
                           <m:ctrlPr>
-                            <a:rPr lang="en-US" altLang="zh-CN" sz="800">
+                            <a:rPr lang="en-US" altLang="zh-CN" sz="800" i="1">
                               <a:latin typeface="Cambria Math" panose="02040503050406030204" pitchFamily="18" charset="0"/>
                             </a:rPr>
                           </m:ctrlPr>
@@ -11116,7 +11116,7 @@
             </p:txBody>
           </p:sp>
         </mc:Choice>
-        <mc:Fallback>
+        <mc:Fallback xmlns="">
           <p:sp>
             <p:nvSpPr>
               <p:cNvPr id="6" name="椭圆 5">
@@ -11162,8 +11162,8 @@
           </p:sp>
         </mc:Fallback>
       </mc:AlternateContent>
-      <mc:AlternateContent xmlns:mc="http://schemas.openxmlformats.org/markup-compatibility/2006">
-        <mc:Choice xmlns:a14="http://schemas.microsoft.com/office/drawing/2010/main" Requires="a14">
+      <mc:AlternateContent xmlns:mc="http://schemas.openxmlformats.org/markup-compatibility/2006" xmlns:a14="http://schemas.microsoft.com/office/drawing/2010/main">
+        <mc:Choice Requires="a14">
           <p:sp>
             <p:nvSpPr>
               <p:cNvPr id="8" name="椭圆 7">
@@ -11214,7 +11214,7 @@
                       <m:sSub>
                         <m:sSubPr>
                           <m:ctrlPr>
-                            <a:rPr lang="en-US" altLang="zh-CN" sz="800">
+                            <a:rPr lang="en-US" altLang="zh-CN" sz="800" i="1">
                               <a:latin typeface="Cambria Math" panose="02040503050406030204" pitchFamily="18" charset="0"/>
                             </a:rPr>
                           </m:ctrlPr>
@@ -11259,7 +11259,7 @@
             </p:txBody>
           </p:sp>
         </mc:Choice>
-        <mc:Fallback>
+        <mc:Fallback xmlns="">
           <p:sp>
             <p:nvSpPr>
               <p:cNvPr id="8" name="椭圆 7">
@@ -11305,8 +11305,8 @@
           </p:sp>
         </mc:Fallback>
       </mc:AlternateContent>
-      <mc:AlternateContent xmlns:mc="http://schemas.openxmlformats.org/markup-compatibility/2006">
-        <mc:Choice xmlns:a14="http://schemas.microsoft.com/office/drawing/2010/main" Requires="a14">
+      <mc:AlternateContent xmlns:mc="http://schemas.openxmlformats.org/markup-compatibility/2006" xmlns:a14="http://schemas.microsoft.com/office/drawing/2010/main">
+        <mc:Choice Requires="a14">
           <p:sp>
             <p:nvSpPr>
               <p:cNvPr id="9" name="椭圆 8">
@@ -11357,7 +11357,7 @@
                       <m:sSub>
                         <m:sSubPr>
                           <m:ctrlPr>
-                            <a:rPr lang="en-US" altLang="zh-CN" sz="800">
+                            <a:rPr lang="en-US" altLang="zh-CN" sz="800" i="1">
                               <a:latin typeface="Cambria Math" panose="02040503050406030204" pitchFamily="18" charset="0"/>
                             </a:rPr>
                           </m:ctrlPr>
@@ -11396,7 +11396,7 @@
             </p:txBody>
           </p:sp>
         </mc:Choice>
-        <mc:Fallback>
+        <mc:Fallback xmlns="">
           <p:sp>
             <p:nvSpPr>
               <p:cNvPr id="9" name="椭圆 8">
@@ -11442,8 +11442,8 @@
           </p:sp>
         </mc:Fallback>
       </mc:AlternateContent>
-      <mc:AlternateContent xmlns:mc="http://schemas.openxmlformats.org/markup-compatibility/2006">
-        <mc:Choice xmlns:a14="http://schemas.microsoft.com/office/drawing/2010/main" Requires="a14">
+      <mc:AlternateContent xmlns:mc="http://schemas.openxmlformats.org/markup-compatibility/2006" xmlns:a14="http://schemas.microsoft.com/office/drawing/2010/main">
+        <mc:Choice Requires="a14">
           <p:sp>
             <p:nvSpPr>
               <p:cNvPr id="11" name="椭圆 10">
@@ -11494,7 +11494,7 @@
                       <m:sSub>
                         <m:sSubPr>
                           <m:ctrlPr>
-                            <a:rPr lang="en-US" altLang="zh-CN" sz="800">
+                            <a:rPr lang="en-US" altLang="zh-CN" sz="800" i="1">
                               <a:latin typeface="Cambria Math" panose="02040503050406030204" pitchFamily="18" charset="0"/>
                             </a:rPr>
                           </m:ctrlPr>
@@ -11530,7 +11530,7 @@
             </p:txBody>
           </p:sp>
         </mc:Choice>
-        <mc:Fallback>
+        <mc:Fallback xmlns="">
           <p:sp>
             <p:nvSpPr>
               <p:cNvPr id="11" name="椭圆 10">
@@ -11576,8 +11576,8 @@
           </p:sp>
         </mc:Fallback>
       </mc:AlternateContent>
-      <mc:AlternateContent xmlns:mc="http://schemas.openxmlformats.org/markup-compatibility/2006">
-        <mc:Choice xmlns:a14="http://schemas.microsoft.com/office/drawing/2010/main" Requires="a14">
+      <mc:AlternateContent xmlns:mc="http://schemas.openxmlformats.org/markup-compatibility/2006" xmlns:a14="http://schemas.microsoft.com/office/drawing/2010/main">
+        <mc:Choice Requires="a14">
           <p:sp>
             <p:nvSpPr>
               <p:cNvPr id="12" name="文本框 11">
@@ -11631,7 +11631,7 @@
             </p:txBody>
           </p:sp>
         </mc:Choice>
-        <mc:Fallback>
+        <mc:Fallback xmlns="">
           <p:sp>
             <p:nvSpPr>
               <p:cNvPr id="12" name="文本框 11">
@@ -11772,8 +11772,8 @@
           </a:p>
         </p:txBody>
       </p:sp>
-      <mc:AlternateContent xmlns:mc="http://schemas.openxmlformats.org/markup-compatibility/2006">
-        <mc:Choice xmlns:a14="http://schemas.microsoft.com/office/drawing/2010/main" Requires="a14">
+      <mc:AlternateContent xmlns:mc="http://schemas.openxmlformats.org/markup-compatibility/2006" xmlns:a14="http://schemas.microsoft.com/office/drawing/2010/main">
+        <mc:Choice Requires="a14">
           <p:sp>
             <p:nvSpPr>
               <p:cNvPr id="17" name="文本框 16">
@@ -11827,7 +11827,7 @@
             </p:txBody>
           </p:sp>
         </mc:Choice>
-        <mc:Fallback>
+        <mc:Fallback xmlns="">
           <p:sp>
             <p:nvSpPr>
               <p:cNvPr id="17" name="文本框 16">
@@ -11968,8 +11968,8 @@
           </a:p>
         </p:txBody>
       </p:sp>
-      <mc:AlternateContent xmlns:mc="http://schemas.openxmlformats.org/markup-compatibility/2006">
-        <mc:Choice xmlns:a14="http://schemas.microsoft.com/office/drawing/2010/main" Requires="a14">
+      <mc:AlternateContent xmlns:mc="http://schemas.openxmlformats.org/markup-compatibility/2006" xmlns:a14="http://schemas.microsoft.com/office/drawing/2010/main">
+        <mc:Choice Requires="a14">
           <p:sp>
             <p:nvSpPr>
               <p:cNvPr id="20" name="文本框 19">
@@ -12023,7 +12023,7 @@
             </p:txBody>
           </p:sp>
         </mc:Choice>
-        <mc:Fallback>
+        <mc:Fallback xmlns="">
           <p:sp>
             <p:nvSpPr>
               <p:cNvPr id="20" name="文本框 19">
@@ -12068,8 +12068,8 @@
           </p:sp>
         </mc:Fallback>
       </mc:AlternateContent>
-      <mc:AlternateContent xmlns:mc="http://schemas.openxmlformats.org/markup-compatibility/2006">
-        <mc:Choice xmlns:a14="http://schemas.microsoft.com/office/drawing/2010/main" Requires="a14">
+      <mc:AlternateContent xmlns:mc="http://schemas.openxmlformats.org/markup-compatibility/2006" xmlns:a14="http://schemas.microsoft.com/office/drawing/2010/main">
+        <mc:Choice Requires="a14">
           <p:sp>
             <p:nvSpPr>
               <p:cNvPr id="26" name="椭圆 25">
@@ -12120,7 +12120,7 @@
                       <m:sSub>
                         <m:sSubPr>
                           <m:ctrlPr>
-                            <a:rPr lang="en-US" altLang="zh-CN" sz="800">
+                            <a:rPr lang="en-US" altLang="zh-CN" sz="800" i="1">
                               <a:latin typeface="Cambria Math" panose="02040503050406030204" pitchFamily="18" charset="0"/>
                             </a:rPr>
                           </m:ctrlPr>
@@ -12130,7 +12130,7 @@
                             <m:accPr>
                               <m:chr m:val="̂"/>
                               <m:ctrlPr>
-                                <a:rPr lang="en-US" altLang="zh-CN" sz="800">
+                                <a:rPr lang="en-US" altLang="zh-CN" sz="800" i="1">
                                   <a:latin typeface="Cambria Math" panose="02040503050406030204" pitchFamily="18" charset="0"/>
                                 </a:rPr>
                               </m:ctrlPr>
@@ -12168,7 +12168,7 @@
             </p:txBody>
           </p:sp>
         </mc:Choice>
-        <mc:Fallback>
+        <mc:Fallback xmlns="">
           <p:sp>
             <p:nvSpPr>
               <p:cNvPr id="26" name="椭圆 25">
@@ -12214,8 +12214,8 @@
           </p:sp>
         </mc:Fallback>
       </mc:AlternateContent>
-      <mc:AlternateContent xmlns:mc="http://schemas.openxmlformats.org/markup-compatibility/2006">
-        <mc:Choice xmlns:a14="http://schemas.microsoft.com/office/drawing/2010/main" Requires="a14">
+      <mc:AlternateContent xmlns:mc="http://schemas.openxmlformats.org/markup-compatibility/2006" xmlns:a14="http://schemas.microsoft.com/office/drawing/2010/main">
+        <mc:Choice Requires="a14">
           <p:sp>
             <p:nvSpPr>
               <p:cNvPr id="27" name="椭圆 26">
@@ -12266,7 +12266,7 @@
                       <m:sSub>
                         <m:sSubPr>
                           <m:ctrlPr>
-                            <a:rPr lang="en-US" altLang="zh-CN" sz="800">
+                            <a:rPr lang="en-US" altLang="zh-CN" sz="800" i="1" smtClean="0">
                               <a:latin typeface="Cambria Math" panose="02040503050406030204" pitchFamily="18" charset="0"/>
                             </a:rPr>
                           </m:ctrlPr>
@@ -12276,7 +12276,7 @@
                             <m:accPr>
                               <m:chr m:val="̂"/>
                               <m:ctrlPr>
-                                <a:rPr lang="en-US" altLang="zh-CN" sz="800">
+                                <a:rPr lang="en-US" altLang="zh-CN" sz="800" i="1">
                                   <a:latin typeface="Cambria Math" panose="02040503050406030204" pitchFamily="18" charset="0"/>
                                 </a:rPr>
                               </m:ctrlPr>
@@ -12299,7 +12299,13 @@
                             <a:rPr lang="en-US" altLang="zh-CN" sz="800" b="0" i="0" smtClean="0">
                               <a:latin typeface="Cambria Math" panose="02040503050406030204" pitchFamily="18" charset="0"/>
                             </a:rPr>
-                            <m:t>10</m:t>
+                            <m:t>1</m:t>
+                          </m:r>
+                          <m:r>
+                            <a:rPr lang="en-US" altLang="zh-CN" sz="800" b="0" i="1" smtClean="0">
+                              <a:latin typeface="Cambria Math" panose="02040503050406030204" pitchFamily="18" charset="0"/>
+                            </a:rPr>
+                            <m:t>5</m:t>
                           </m:r>
                         </m:sub>
                       </m:sSub>
@@ -12314,7 +12320,7 @@
             </p:txBody>
           </p:sp>
         </mc:Choice>
-        <mc:Fallback>
+        <mc:Fallback xmlns="">
           <p:sp>
             <p:nvSpPr>
               <p:cNvPr id="27" name="椭圆 26">
@@ -12360,8 +12366,8 @@
           </p:sp>
         </mc:Fallback>
       </mc:AlternateContent>
-      <mc:AlternateContent xmlns:mc="http://schemas.openxmlformats.org/markup-compatibility/2006">
-        <mc:Choice xmlns:a14="http://schemas.microsoft.com/office/drawing/2010/main" Requires="a14">
+      <mc:AlternateContent xmlns:mc="http://schemas.openxmlformats.org/markup-compatibility/2006" xmlns:a14="http://schemas.microsoft.com/office/drawing/2010/main">
+        <mc:Choice Requires="a14">
           <p:sp>
             <p:nvSpPr>
               <p:cNvPr id="28" name="文本框 27">
@@ -12415,7 +12421,7 @@
             </p:txBody>
           </p:sp>
         </mc:Choice>
-        <mc:Fallback>
+        <mc:Fallback xmlns="">
           <p:sp>
             <p:nvSpPr>
               <p:cNvPr id="28" name="文本框 27">
@@ -12621,8 +12627,8 @@
         </p:nvSpPr>
         <p:spPr>
           <a:xfrm>
-            <a:off x="1376549" y="3813921"/>
-            <a:ext cx="637550" cy="215444"/>
+            <a:off x="1288627" y="3820668"/>
+            <a:ext cx="784291" cy="338554"/>
           </a:xfrm>
           <a:prstGeom prst="rect">
             <a:avLst/>
@@ -12635,19 +12641,48 @@
           </a:bodyPr>
           <a:lstStyle/>
           <a:p>
+            <a:pPr marL="171450" indent="-171450">
+              <a:buFont typeface="Arial" panose="020B0604020202020204" pitchFamily="34" charset="0"/>
+              <a:buChar char="•"/>
+            </a:pPr>
             <a:r>
               <a:rPr lang="en-US" altLang="zh-CN" sz="800" dirty="0">
                 <a:latin typeface="Arial" panose="020B0604020202020204" pitchFamily="34" charset="0"/>
                 <a:ea typeface="楷体" panose="02010609060101010101" pitchFamily="49" charset="-122"/>
                 <a:cs typeface="Arial" panose="020B0604020202020204" pitchFamily="34" charset="0"/>
               </a:rPr>
-              <a:t>L1: 100D</a:t>
+              <a:t>L1: 200D</a:t>
             </a:r>
-            <a:endParaRPr lang="zh-CN" altLang="en-US" sz="800" dirty="0">
-              <a:latin typeface="Arial" panose="020B0604020202020204" pitchFamily="34" charset="0"/>
-              <a:ea typeface="楷体" panose="02010609060101010101" pitchFamily="49" charset="-122"/>
-              <a:cs typeface="Arial" panose="020B0604020202020204" pitchFamily="34" charset="0"/>
-            </a:endParaRPr>
+          </a:p>
+          <a:p>
+            <a:pPr marL="171450" indent="-171450">
+              <a:buFont typeface="Arial" panose="020B0604020202020204" pitchFamily="34" charset="0"/>
+              <a:buChar char="•"/>
+            </a:pPr>
+            <a:r>
+              <a:rPr lang="en-US" altLang="zh-CN" sz="800" dirty="0">
+                <a:latin typeface="Arial" panose="020B0604020202020204" pitchFamily="34" charset="0"/>
+                <a:ea typeface="楷体" panose="02010609060101010101" pitchFamily="49" charset="-122"/>
+                <a:cs typeface="Arial" panose="020B0604020202020204" pitchFamily="34" charset="0"/>
+              </a:rPr>
+              <a:t>DR:</a:t>
+            </a:r>
+            <a:r>
+              <a:rPr lang="zh-CN" altLang="en-US" sz="800" dirty="0">
+                <a:latin typeface="Arial" panose="020B0604020202020204" pitchFamily="34" charset="0"/>
+                <a:ea typeface="楷体" panose="02010609060101010101" pitchFamily="49" charset="-122"/>
+                <a:cs typeface="Arial" panose="020B0604020202020204" pitchFamily="34" charset="0"/>
+              </a:rPr>
+              <a:t> </a:t>
+            </a:r>
+            <a:r>
+              <a:rPr lang="en-US" altLang="zh-CN" sz="800" dirty="0">
+                <a:latin typeface="Arial" panose="020B0604020202020204" pitchFamily="34" charset="0"/>
+                <a:ea typeface="楷体" panose="02010609060101010101" pitchFamily="49" charset="-122"/>
+                <a:cs typeface="Arial" panose="020B0604020202020204" pitchFamily="34" charset="0"/>
+              </a:rPr>
+              <a:t>0.05</a:t>
+            </a:r>
           </a:p>
         </p:txBody>
       </p:sp>
@@ -12665,8 +12700,8 @@
         </p:nvSpPr>
         <p:spPr>
           <a:xfrm>
-            <a:off x="2132300" y="4032470"/>
-            <a:ext cx="680393" cy="215444"/>
+            <a:off x="2015009" y="4046075"/>
+            <a:ext cx="863013" cy="461665"/>
           </a:xfrm>
           <a:prstGeom prst="rect">
             <a:avLst/>
@@ -12679,14 +12714,61 @@
           </a:bodyPr>
           <a:lstStyle/>
           <a:p>
-            <a:pPr algn="ctr"/>
+            <a:pPr marL="171450" indent="-171450">
+              <a:buFont typeface="Arial" panose="020B0604020202020204" pitchFamily="34" charset="0"/>
+              <a:buChar char="•"/>
+            </a:pPr>
             <a:r>
               <a:rPr lang="en-US" altLang="zh-CN" sz="800" dirty="0">
                 <a:latin typeface="Arial" panose="020B0604020202020204" pitchFamily="34" charset="0"/>
                 <a:ea typeface="楷体" panose="02010609060101010101" pitchFamily="49" charset="-122"/>
                 <a:cs typeface="Arial" panose="020B0604020202020204" pitchFamily="34" charset="0"/>
               </a:rPr>
-              <a:t>L2: 1000D</a:t>
+              <a:t>L2: 2,000D</a:t>
+            </a:r>
+          </a:p>
+          <a:p>
+            <a:pPr marL="171450" indent="-171450">
+              <a:buFont typeface="Arial" panose="020B0604020202020204" pitchFamily="34" charset="0"/>
+              <a:buChar char="•"/>
+            </a:pPr>
+            <a:r>
+              <a:rPr lang="en-US" altLang="zh-CN" sz="800" dirty="0">
+                <a:latin typeface="Arial" panose="020B0604020202020204" pitchFamily="34" charset="0"/>
+                <a:ea typeface="楷体" panose="02010609060101010101" pitchFamily="49" charset="-122"/>
+                <a:cs typeface="Arial" panose="020B0604020202020204" pitchFamily="34" charset="0"/>
+              </a:rPr>
+              <a:t>LN</a:t>
+            </a:r>
+          </a:p>
+          <a:p>
+            <a:pPr marL="171450" indent="-171450">
+              <a:buFont typeface="Arial" panose="020B0604020202020204" pitchFamily="34" charset="0"/>
+              <a:buChar char="•"/>
+            </a:pPr>
+            <a:r>
+              <a:rPr lang="en-US" altLang="zh-CN" sz="800" dirty="0">
+                <a:latin typeface="Arial" panose="020B0604020202020204" pitchFamily="34" charset="0"/>
+                <a:ea typeface="楷体" panose="02010609060101010101" pitchFamily="49" charset="-122"/>
+                <a:cs typeface="Arial" panose="020B0604020202020204" pitchFamily="34" charset="0"/>
+              </a:rPr>
+              <a:t>DR:</a:t>
+            </a:r>
+            <a:r>
+              <a:rPr lang="zh-CN" altLang="en-US" sz="800" dirty="0">
+                <a:latin typeface="Arial" panose="020B0604020202020204" pitchFamily="34" charset="0"/>
+                <a:ea typeface="楷体" panose="02010609060101010101" pitchFamily="49" charset="-122"/>
+                <a:cs typeface="Arial" panose="020B0604020202020204" pitchFamily="34" charset="0"/>
+              </a:rPr>
+              <a:t> </a:t>
+            </a:r>
+            <a:r>
+              <a:rPr lang="en-US" altLang="zh-CN" sz="800" dirty="0">
+                <a:latin typeface="Arial" panose="020B0604020202020204" pitchFamily="34" charset="0"/>
+                <a:ea typeface="楷体" panose="02010609060101010101" pitchFamily="49" charset="-122"/>
+                <a:cs typeface="Arial" panose="020B0604020202020204" pitchFamily="34" charset="0"/>
+              </a:rPr>
+              <a:t>0.05</a:t>
             </a:r>
           </a:p>
         </p:txBody>
@@ -12726,7 +12808,7 @@
                 <a:ea typeface="楷体" panose="02010609060101010101" pitchFamily="49" charset="-122"/>
                 <a:cs typeface="Arial" panose="020B0604020202020204" pitchFamily="34" charset="0"/>
               </a:rPr>
-              <a:t>Output layer: 10D</a:t>
+              <a:t>Output layer: 15D</a:t>
             </a:r>
           </a:p>
         </p:txBody>
@@ -13546,8 +13628,8 @@
           </a:p>
         </p:txBody>
       </p:sp>
-      <mc:AlternateContent xmlns:mc="http://schemas.openxmlformats.org/markup-compatibility/2006">
-        <mc:Choice xmlns:a14="http://schemas.microsoft.com/office/drawing/2010/main" Requires="a14">
+      <mc:AlternateContent xmlns:mc="http://schemas.openxmlformats.org/markup-compatibility/2006" xmlns:a14="http://schemas.microsoft.com/office/drawing/2010/main">
+        <mc:Choice Requires="a14">
           <p:sp>
             <p:nvSpPr>
               <p:cNvPr id="117" name="文本框 116"/>
@@ -13595,7 +13677,7 @@
             </p:txBody>
           </p:sp>
         </mc:Choice>
-        <mc:Fallback>
+        <mc:Fallback xmlns="">
           <p:sp>
             <p:nvSpPr>
               <p:cNvPr id="117" name="文本框 116"/>
@@ -14062,8 +14144,8 @@
           </a:p>
         </p:txBody>
       </p:sp>
-      <mc:AlternateContent xmlns:mc="http://schemas.openxmlformats.org/markup-compatibility/2006">
-        <mc:Choice xmlns:a14="http://schemas.microsoft.com/office/drawing/2010/main" Requires="a14">
+      <mc:AlternateContent xmlns:mc="http://schemas.openxmlformats.org/markup-compatibility/2006" xmlns:a14="http://schemas.microsoft.com/office/drawing/2010/main">
+        <mc:Choice Requires="a14">
           <p:sp>
             <p:nvSpPr>
               <p:cNvPr id="272" name="文本框 16">
@@ -14117,7 +14199,7 @@
             </p:txBody>
           </p:sp>
         </mc:Choice>
-        <mc:Fallback>
+        <mc:Fallback xmlns="">
           <p:sp>
             <p:nvSpPr>
               <p:cNvPr id="272" name="文本框 16">
@@ -14307,8 +14389,8 @@
           </a:p>
         </p:txBody>
       </p:sp>
-      <mc:AlternateContent xmlns:mc="http://schemas.openxmlformats.org/markup-compatibility/2006">
-        <mc:Choice xmlns:a14="http://schemas.microsoft.com/office/drawing/2010/main" Requires="a14">
+      <mc:AlternateContent xmlns:mc="http://schemas.openxmlformats.org/markup-compatibility/2006" xmlns:a14="http://schemas.microsoft.com/office/drawing/2010/main">
+        <mc:Choice Requires="a14">
           <p:sp>
             <p:nvSpPr>
               <p:cNvPr id="321" name="文本框 19">
@@ -14362,7 +14444,7 @@
             </p:txBody>
           </p:sp>
         </mc:Choice>
-        <mc:Fallback>
+        <mc:Fallback xmlns="">
           <p:sp>
             <p:nvSpPr>
               <p:cNvPr id="321" name="文本框 19">
@@ -14666,8 +14748,8 @@
         </p:nvSpPr>
         <p:spPr>
           <a:xfrm>
-            <a:off x="2889269" y="4027794"/>
-            <a:ext cx="680393" cy="215444"/>
+            <a:off x="2878022" y="4045781"/>
+            <a:ext cx="863013" cy="461665"/>
           </a:xfrm>
           <a:prstGeom prst="rect">
             <a:avLst/>
@@ -14680,14 +14762,61 @@
           </a:bodyPr>
           <a:lstStyle/>
           <a:p>
-            <a:pPr algn="ctr"/>
+            <a:pPr marL="171450" indent="-171450">
+              <a:buFont typeface="Arial" panose="020B0604020202020204" pitchFamily="34" charset="0"/>
+              <a:buChar char="•"/>
+            </a:pPr>
             <a:r>
               <a:rPr lang="en-US" altLang="zh-CN" sz="800" dirty="0">
                 <a:latin typeface="Arial" panose="020B0604020202020204" pitchFamily="34" charset="0"/>
                 <a:ea typeface="楷体" panose="02010609060101010101" pitchFamily="49" charset="-122"/>
                 <a:cs typeface="Arial" panose="020B0604020202020204" pitchFamily="34" charset="0"/>
               </a:rPr>
-              <a:t>L3: 1000D</a:t>
+              <a:t>L3: 2,000D</a:t>
+            </a:r>
+          </a:p>
+          <a:p>
+            <a:pPr marL="171450" indent="-171450">
+              <a:buFont typeface="Arial" panose="020B0604020202020204" pitchFamily="34" charset="0"/>
+              <a:buChar char="•"/>
+            </a:pPr>
+            <a:r>
+              <a:rPr lang="en-US" altLang="zh-CN" sz="800" dirty="0">
+                <a:latin typeface="Arial" panose="020B0604020202020204" pitchFamily="34" charset="0"/>
+                <a:ea typeface="楷体" panose="02010609060101010101" pitchFamily="49" charset="-122"/>
+                <a:cs typeface="Arial" panose="020B0604020202020204" pitchFamily="34" charset="0"/>
+              </a:rPr>
+              <a:t>LN</a:t>
+            </a:r>
+          </a:p>
+          <a:p>
+            <a:pPr marL="171450" indent="-171450">
+              <a:buFont typeface="Arial" panose="020B0604020202020204" pitchFamily="34" charset="0"/>
+              <a:buChar char="•"/>
+            </a:pPr>
+            <a:r>
+              <a:rPr lang="en-US" altLang="zh-CN" sz="800" dirty="0">
+                <a:latin typeface="Arial" panose="020B0604020202020204" pitchFamily="34" charset="0"/>
+                <a:ea typeface="楷体" panose="02010609060101010101" pitchFamily="49" charset="-122"/>
+                <a:cs typeface="Arial" panose="020B0604020202020204" pitchFamily="34" charset="0"/>
+              </a:rPr>
+              <a:t>DR:</a:t>
+            </a:r>
+            <a:r>
+              <a:rPr lang="zh-CN" altLang="en-US" sz="800" dirty="0">
+                <a:latin typeface="Arial" panose="020B0604020202020204" pitchFamily="34" charset="0"/>
+                <a:ea typeface="楷体" panose="02010609060101010101" pitchFamily="49" charset="-122"/>
+                <a:cs typeface="Arial" panose="020B0604020202020204" pitchFamily="34" charset="0"/>
+              </a:rPr>
+              <a:t> </a:t>
+            </a:r>
+            <a:r>
+              <a:rPr lang="en-US" altLang="zh-CN" sz="800" dirty="0">
+                <a:latin typeface="Arial" panose="020B0604020202020204" pitchFamily="34" charset="0"/>
+                <a:ea typeface="楷体" panose="02010609060101010101" pitchFamily="49" charset="-122"/>
+                <a:cs typeface="Arial" panose="020B0604020202020204" pitchFamily="34" charset="0"/>
+              </a:rPr>
+              <a:t>0.05</a:t>
             </a:r>
           </a:p>
         </p:txBody>
@@ -14706,8 +14835,8 @@
         </p:nvSpPr>
         <p:spPr>
           <a:xfrm>
-            <a:off x="3541904" y="4029365"/>
-            <a:ext cx="962072" cy="338554"/>
+            <a:off x="3604404" y="4041596"/>
+            <a:ext cx="863013" cy="461665"/>
           </a:xfrm>
           <a:prstGeom prst="rect">
             <a:avLst/>
@@ -14720,41 +14849,45 @@
           </a:bodyPr>
           <a:lstStyle/>
           <a:p>
-            <a:pPr algn="ctr"/>
+            <a:pPr marL="171450" indent="-171450">
+              <a:buFont typeface="Arial" panose="020B0604020202020204" pitchFamily="34" charset="0"/>
+              <a:buChar char="•"/>
+            </a:pPr>
             <a:r>
               <a:rPr lang="en-US" altLang="zh-CN" sz="800" dirty="0">
                 <a:latin typeface="Arial" panose="020B0604020202020204" pitchFamily="34" charset="0"/>
                 <a:ea typeface="楷体" panose="02010609060101010101" pitchFamily="49" charset="-122"/>
                 <a:cs typeface="Arial" panose="020B0604020202020204" pitchFamily="34" charset="0"/>
               </a:rPr>
-              <a:t>L4: 1000D</a:t>
+              <a:t>L4: 2,000D</a:t>
             </a:r>
           </a:p>
           <a:p>
-            <a:pPr algn="ctr"/>
+            <a:pPr marL="171450" indent="-171450">
+              <a:buFont typeface="Arial" panose="020B0604020202020204" pitchFamily="34" charset="0"/>
+              <a:buChar char="•"/>
+            </a:pPr>
             <a:r>
               <a:rPr lang="en-US" altLang="zh-CN" sz="800" dirty="0">
                 <a:latin typeface="Arial" panose="020B0604020202020204" pitchFamily="34" charset="0"/>
                 <a:ea typeface="楷体" panose="02010609060101010101" pitchFamily="49" charset="-122"/>
                 <a:cs typeface="Arial" panose="020B0604020202020204" pitchFamily="34" charset="0"/>
               </a:rPr>
-              <a:t>Dropout</a:t>
+              <a:t>LN</a:t>
             </a:r>
-            <a:r>
-              <a:rPr lang="zh-CN" altLang="en-US" sz="800" dirty="0">
-                <a:latin typeface="Arial" panose="020B0604020202020204" pitchFamily="34" charset="0"/>
-                <a:ea typeface="楷体" panose="02010609060101010101" pitchFamily="49" charset="-122"/>
-                <a:cs typeface="Arial" panose="020B0604020202020204" pitchFamily="34" charset="0"/>
-              </a:rPr>
-              <a:t> </a:t>
-            </a:r>
+          </a:p>
+          <a:p>
+            <a:pPr marL="171450" indent="-171450">
+              <a:buFont typeface="Arial" panose="020B0604020202020204" pitchFamily="34" charset="0"/>
+              <a:buChar char="•"/>
+            </a:pPr>
             <a:r>
               <a:rPr lang="en-US" altLang="zh-CN" sz="800" dirty="0">
                 <a:latin typeface="Arial" panose="020B0604020202020204" pitchFamily="34" charset="0"/>
                 <a:ea typeface="楷体" panose="02010609060101010101" pitchFamily="49" charset="-122"/>
                 <a:cs typeface="Arial" panose="020B0604020202020204" pitchFamily="34" charset="0"/>
               </a:rPr>
-              <a:t>rate:</a:t>
+              <a:t>DR:</a:t>
             </a:r>
             <a:r>
               <a:rPr lang="zh-CN" altLang="en-US" sz="800" dirty="0">
@@ -14985,8 +15118,8 @@
         </p:nvSpPr>
         <p:spPr>
           <a:xfrm>
-            <a:off x="4513986" y="3711543"/>
-            <a:ext cx="574345" cy="215444"/>
+            <a:off x="4463155" y="3711443"/>
+            <a:ext cx="730644" cy="338554"/>
           </a:xfrm>
           <a:prstGeom prst="rect">
             <a:avLst/>
@@ -14999,6 +15132,10 @@
           </a:bodyPr>
           <a:lstStyle/>
           <a:p>
+            <a:pPr marL="171450" indent="-171450">
+              <a:buFont typeface="Arial" panose="020B0604020202020204" pitchFamily="34" charset="0"/>
+              <a:buChar char="•"/>
+            </a:pPr>
             <a:r>
               <a:rPr lang="en-US" altLang="zh-CN" sz="800" dirty="0">
                 <a:latin typeface="Arial" panose="020B0604020202020204" pitchFamily="34" charset="0"/>
@@ -15006,6 +15143,20 @@
                 <a:cs typeface="Arial" panose="020B0604020202020204" pitchFamily="34" charset="0"/>
               </a:rPr>
               <a:t>L5: 50D</a:t>
+            </a:r>
+          </a:p>
+          <a:p>
+            <a:pPr marL="171450" indent="-171450">
+              <a:buFont typeface="Arial" panose="020B0604020202020204" pitchFamily="34" charset="0"/>
+              <a:buChar char="•"/>
+            </a:pPr>
+            <a:r>
+              <a:rPr lang="en-US" altLang="zh-CN" sz="800" dirty="0">
+                <a:latin typeface="Arial" panose="020B0604020202020204" pitchFamily="34" charset="0"/>
+                <a:ea typeface="楷体" panose="02010609060101010101" pitchFamily="49" charset="-122"/>
+                <a:cs typeface="Arial" panose="020B0604020202020204" pitchFamily="34" charset="0"/>
+              </a:rPr>
+              <a:t>LN</a:t>
             </a:r>
             <a:endParaRPr lang="zh-CN" altLang="en-US" sz="800" dirty="0">
               <a:latin typeface="Arial" panose="020B0604020202020204" pitchFamily="34" charset="0"/>
@@ -15015,12 +15166,345 @@
           </a:p>
         </p:txBody>
       </p:sp>
+      <mc:AlternateContent xmlns:mc="http://schemas.openxmlformats.org/markup-compatibility/2006" xmlns:a14="http://schemas.microsoft.com/office/drawing/2010/main">
+        <mc:Choice Requires="a14">
+          <p:sp>
+            <p:nvSpPr>
+              <p:cNvPr id="2" name="文本框 33">
+                <a:extLst>
+                  <a:ext uri="{FF2B5EF4-FFF2-40B4-BE49-F238E27FC236}">
+                    <a16:creationId xmlns:a16="http://schemas.microsoft.com/office/drawing/2014/main" id="{F44533B4-D453-626F-D8E4-D63BC925CD78}"/>
+                  </a:ext>
+                </a:extLst>
+              </p:cNvPr>
+              <p:cNvSpPr txBox="1"/>
+              <p:nvPr/>
+            </p:nvSpPr>
+            <p:spPr>
+              <a:xfrm>
+                <a:off x="4584727" y="4070955"/>
+                <a:ext cx="1247481" cy="584775"/>
+              </a:xfrm>
+              <a:prstGeom prst="rect">
+                <a:avLst/>
+              </a:prstGeom>
+              <a:noFill/>
+              <a:ln w="9525"/>
+            </p:spPr>
+            <p:style>
+              <a:lnRef idx="2">
+                <a:schemeClr val="dk1"/>
+              </a:lnRef>
+              <a:fillRef idx="1">
+                <a:schemeClr val="lt1"/>
+              </a:fillRef>
+              <a:effectRef idx="0">
+                <a:schemeClr val="dk1"/>
+              </a:effectRef>
+              <a:fontRef idx="minor">
+                <a:schemeClr val="dk1"/>
+              </a:fontRef>
+            </p:style>
+            <p:txBody>
+              <a:bodyPr wrap="square" rtlCol="0">
+                <a:spAutoFit/>
+              </a:bodyPr>
+              <a:lstStyle/>
+              <a:p>
+                <a:r>
+                  <a:rPr lang="en-US" altLang="zh-CN" sz="800" dirty="0">
+                    <a:latin typeface="Arial" panose="020B0604020202020204" pitchFamily="34" charset="0"/>
+                    <a:ea typeface="楷体" panose="02010609060101010101" pitchFamily="49" charset="-122"/>
+                    <a:cs typeface="Arial" panose="020B0604020202020204" pitchFamily="34" charset="0"/>
+                  </a:rPr>
+                  <a:t>L</a:t>
+                </a:r>
+                <a14:m>
+                  <m:oMath xmlns:m="http://schemas.openxmlformats.org/officeDocument/2006/math">
+                    <m:r>
+                      <a:rPr lang="en-US" altLang="zh-CN" sz="800" i="1" dirty="0" smtClean="0">
+                        <a:latin typeface="Cambria Math" panose="02040503050406030204" pitchFamily="18" charset="0"/>
+                        <a:ea typeface="楷体" panose="02010609060101010101" pitchFamily="49" charset="-122"/>
+                        <a:cs typeface="Arial" panose="020B0604020202020204" pitchFamily="34" charset="0"/>
+                      </a:rPr>
+                      <m:t>𝑖</m:t>
+                    </m:r>
+                  </m:oMath>
+                </a14:m>
+                <a:r>
+                  <a:rPr lang="en-US" altLang="zh-CN" sz="800" dirty="0">
+                    <a:latin typeface="Arial" panose="020B0604020202020204" pitchFamily="34" charset="0"/>
+                    <a:ea typeface="楷体" panose="02010609060101010101" pitchFamily="49" charset="-122"/>
+                    <a:cs typeface="Arial" panose="020B0604020202020204" pitchFamily="34" charset="0"/>
+                  </a:rPr>
+                  <a:t>:</a:t>
+                </a:r>
+                <a:r>
+                  <a:rPr lang="zh-CN" altLang="en-US" sz="800" dirty="0">
+                    <a:latin typeface="Arial" panose="020B0604020202020204" pitchFamily="34" charset="0"/>
+                    <a:ea typeface="楷体" panose="02010609060101010101" pitchFamily="49" charset="-122"/>
+                    <a:cs typeface="Arial" panose="020B0604020202020204" pitchFamily="34" charset="0"/>
+                  </a:rPr>
+                  <a:t> </a:t>
+                </a:r>
+                <a:r>
+                  <a:rPr lang="en-US" altLang="zh-CN" sz="800" dirty="0">
+                    <a:latin typeface="Arial" panose="020B0604020202020204" pitchFamily="34" charset="0"/>
+                    <a:ea typeface="楷体" panose="02010609060101010101" pitchFamily="49" charset="-122"/>
+                    <a:cs typeface="Arial" panose="020B0604020202020204" pitchFamily="34" charset="0"/>
+                  </a:rPr>
+                  <a:t>the</a:t>
+                </a:r>
+                <a:r>
+                  <a:rPr lang="zh-CN" altLang="en-US" sz="800" dirty="0">
+                    <a:latin typeface="Arial" panose="020B0604020202020204" pitchFamily="34" charset="0"/>
+                    <a:ea typeface="楷体" panose="02010609060101010101" pitchFamily="49" charset="-122"/>
+                    <a:cs typeface="Arial" panose="020B0604020202020204" pitchFamily="34" charset="0"/>
+                  </a:rPr>
+                  <a:t> </a:t>
+                </a:r>
+                <a14:m>
+                  <m:oMath xmlns:m="http://schemas.openxmlformats.org/officeDocument/2006/math">
+                    <m:r>
+                      <a:rPr lang="en-US" altLang="zh-CN" sz="800" i="1" dirty="0" smtClean="0">
+                        <a:latin typeface="Cambria Math" panose="02040503050406030204" pitchFamily="18" charset="0"/>
+                        <a:ea typeface="楷体" panose="02010609060101010101" pitchFamily="49" charset="-122"/>
+                        <a:cs typeface="Arial" panose="020B0604020202020204" pitchFamily="34" charset="0"/>
+                      </a:rPr>
+                      <m:t>𝑖</m:t>
+                    </m:r>
+                  </m:oMath>
+                </a14:m>
+                <a:r>
+                  <a:rPr lang="en-US" altLang="zh-CN" sz="800" dirty="0" err="1">
+                    <a:latin typeface="Arial" panose="020B0604020202020204" pitchFamily="34" charset="0"/>
+                    <a:ea typeface="楷体" panose="02010609060101010101" pitchFamily="49" charset="-122"/>
+                    <a:cs typeface="Arial" panose="020B0604020202020204" pitchFamily="34" charset="0"/>
+                  </a:rPr>
+                  <a:t>th</a:t>
+                </a:r>
+                <a:r>
+                  <a:rPr lang="zh-CN" altLang="en-US" sz="800" dirty="0">
+                    <a:latin typeface="Arial" panose="020B0604020202020204" pitchFamily="34" charset="0"/>
+                    <a:ea typeface="楷体" panose="02010609060101010101" pitchFamily="49" charset="-122"/>
+                    <a:cs typeface="Arial" panose="020B0604020202020204" pitchFamily="34" charset="0"/>
+                  </a:rPr>
+                  <a:t> </a:t>
+                </a:r>
+                <a:r>
+                  <a:rPr lang="en-US" altLang="zh-CN" sz="800" dirty="0">
+                    <a:latin typeface="Arial" panose="020B0604020202020204" pitchFamily="34" charset="0"/>
+                    <a:ea typeface="楷体" panose="02010609060101010101" pitchFamily="49" charset="-122"/>
+                    <a:cs typeface="Arial" panose="020B0604020202020204" pitchFamily="34" charset="0"/>
+                  </a:rPr>
+                  <a:t>layer</a:t>
+                </a:r>
+              </a:p>
+              <a:p>
+                <a14:m>
+                  <m:oMath xmlns:m="http://schemas.openxmlformats.org/officeDocument/2006/math">
+                    <m:r>
+                      <a:rPr lang="en-US" altLang="zh-CN" sz="800" i="1" dirty="0" smtClean="0">
+                        <a:latin typeface="Cambria Math" panose="02040503050406030204" pitchFamily="18" charset="0"/>
+                        <a:ea typeface="楷体" panose="02010609060101010101" pitchFamily="49" charset="-122"/>
+                        <a:cs typeface="Arial" panose="020B0604020202020204" pitchFamily="34" charset="0"/>
+                      </a:rPr>
+                      <m:t>𝑥</m:t>
+                    </m:r>
+                  </m:oMath>
+                </a14:m>
+                <a:r>
+                  <a:rPr lang="en-US" altLang="zh-CN" sz="800" dirty="0" err="1">
+                    <a:latin typeface="Arial" panose="020B0604020202020204" pitchFamily="34" charset="0"/>
+                    <a:ea typeface="楷体" panose="02010609060101010101" pitchFamily="49" charset="-122"/>
+                    <a:cs typeface="Arial" panose="020B0604020202020204" pitchFamily="34" charset="0"/>
+                  </a:rPr>
+                  <a:t>D</a:t>
+                </a:r>
+                <a:r>
+                  <a:rPr lang="en-US" altLang="zh-CN" sz="800" dirty="0">
+                    <a:latin typeface="Arial" panose="020B0604020202020204" pitchFamily="34" charset="0"/>
+                    <a:ea typeface="楷体" panose="02010609060101010101" pitchFamily="49" charset="-122"/>
+                    <a:cs typeface="Arial" panose="020B0604020202020204" pitchFamily="34" charset="0"/>
+                  </a:rPr>
+                  <a:t>:</a:t>
+                </a:r>
+                <a:r>
+                  <a:rPr lang="zh-CN" altLang="en-US" sz="800" dirty="0">
+                    <a:latin typeface="Arial" panose="020B0604020202020204" pitchFamily="34" charset="0"/>
+                    <a:ea typeface="楷体" panose="02010609060101010101" pitchFamily="49" charset="-122"/>
+                    <a:cs typeface="Arial" panose="020B0604020202020204" pitchFamily="34" charset="0"/>
+                  </a:rPr>
+                  <a:t> </a:t>
+                </a:r>
+                <a14:m>
+                  <m:oMath xmlns:m="http://schemas.openxmlformats.org/officeDocument/2006/math">
+                    <m:r>
+                      <a:rPr lang="en-US" altLang="zh-CN" sz="800" i="1" dirty="0" smtClean="0">
+                        <a:latin typeface="Cambria Math" panose="02040503050406030204" pitchFamily="18" charset="0"/>
+                        <a:ea typeface="楷体" panose="02010609060101010101" pitchFamily="49" charset="-122"/>
+                        <a:cs typeface="Arial" panose="020B0604020202020204" pitchFamily="34" charset="0"/>
+                      </a:rPr>
+                      <m:t>𝑥</m:t>
+                    </m:r>
+                  </m:oMath>
+                </a14:m>
+                <a:r>
+                  <a:rPr lang="zh-CN" altLang="en-US" sz="800" dirty="0">
+                    <a:latin typeface="Arial" panose="020B0604020202020204" pitchFamily="34" charset="0"/>
+                    <a:ea typeface="楷体" panose="02010609060101010101" pitchFamily="49" charset="-122"/>
+                    <a:cs typeface="Arial" panose="020B0604020202020204" pitchFamily="34" charset="0"/>
+                  </a:rPr>
+                  <a:t> </a:t>
+                </a:r>
+                <a:r>
+                  <a:rPr lang="en-US" altLang="zh-CN" sz="800" dirty="0">
+                    <a:latin typeface="Arial" panose="020B0604020202020204" pitchFamily="34" charset="0"/>
+                    <a:ea typeface="楷体" panose="02010609060101010101" pitchFamily="49" charset="-122"/>
+                    <a:cs typeface="Arial" panose="020B0604020202020204" pitchFamily="34" charset="0"/>
+                  </a:rPr>
+                  <a:t>dimension</a:t>
+                </a:r>
+              </a:p>
+              <a:p>
+                <a:r>
+                  <a:rPr lang="en-US" altLang="zh-CN" sz="800" dirty="0">
+                    <a:latin typeface="Arial" panose="020B0604020202020204" pitchFamily="34" charset="0"/>
+                    <a:ea typeface="楷体" panose="02010609060101010101" pitchFamily="49" charset="-122"/>
+                    <a:cs typeface="Arial" panose="020B0604020202020204" pitchFamily="34" charset="0"/>
+                  </a:rPr>
+                  <a:t>LN:</a:t>
+                </a:r>
+                <a:r>
+                  <a:rPr lang="zh-CN" altLang="en-US" sz="800" dirty="0">
+                    <a:latin typeface="Arial" panose="020B0604020202020204" pitchFamily="34" charset="0"/>
+                    <a:ea typeface="楷体" panose="02010609060101010101" pitchFamily="49" charset="-122"/>
+                    <a:cs typeface="Arial" panose="020B0604020202020204" pitchFamily="34" charset="0"/>
+                  </a:rPr>
+                  <a:t> </a:t>
+                </a:r>
+                <a:r>
+                  <a:rPr lang="en-US" altLang="zh-CN" sz="800" dirty="0">
+                    <a:latin typeface="Arial" panose="020B0604020202020204" pitchFamily="34" charset="0"/>
+                    <a:ea typeface="楷体" panose="02010609060101010101" pitchFamily="49" charset="-122"/>
+                    <a:cs typeface="Arial" panose="020B0604020202020204" pitchFamily="34" charset="0"/>
+                  </a:rPr>
+                  <a:t>layer</a:t>
+                </a:r>
+                <a:r>
+                  <a:rPr lang="zh-CN" altLang="en-US" sz="800" dirty="0">
+                    <a:latin typeface="Arial" panose="020B0604020202020204" pitchFamily="34" charset="0"/>
+                    <a:ea typeface="楷体" panose="02010609060101010101" pitchFamily="49" charset="-122"/>
+                    <a:cs typeface="Arial" panose="020B0604020202020204" pitchFamily="34" charset="0"/>
+                  </a:rPr>
+                  <a:t> </a:t>
+                </a:r>
+                <a:r>
+                  <a:rPr lang="en-US" altLang="zh-CN" sz="800" dirty="0">
+                    <a:latin typeface="Arial" panose="020B0604020202020204" pitchFamily="34" charset="0"/>
+                    <a:ea typeface="楷体" panose="02010609060101010101" pitchFamily="49" charset="-122"/>
+                    <a:cs typeface="Arial" panose="020B0604020202020204" pitchFamily="34" charset="0"/>
+                  </a:rPr>
+                  <a:t>normalization</a:t>
+                </a:r>
+              </a:p>
+              <a:p>
+                <a:r>
+                  <a:rPr lang="en-US" altLang="zh-CN" sz="800" dirty="0">
+                    <a:latin typeface="Arial" panose="020B0604020202020204" pitchFamily="34" charset="0"/>
+                    <a:ea typeface="楷体" panose="02010609060101010101" pitchFamily="49" charset="-122"/>
+                    <a:cs typeface="Arial" panose="020B0604020202020204" pitchFamily="34" charset="0"/>
+                  </a:rPr>
+                  <a:t>DR:</a:t>
+                </a:r>
+                <a:r>
+                  <a:rPr lang="zh-CN" altLang="en-US" sz="800" dirty="0">
+                    <a:latin typeface="Arial" panose="020B0604020202020204" pitchFamily="34" charset="0"/>
+                    <a:ea typeface="楷体" panose="02010609060101010101" pitchFamily="49" charset="-122"/>
+                    <a:cs typeface="Arial" panose="020B0604020202020204" pitchFamily="34" charset="0"/>
+                  </a:rPr>
+                  <a:t> </a:t>
+                </a:r>
+                <a:r>
+                  <a:rPr lang="en-US" altLang="zh-CN" sz="800" dirty="0">
+                    <a:latin typeface="Arial" panose="020B0604020202020204" pitchFamily="34" charset="0"/>
+                    <a:ea typeface="楷体" panose="02010609060101010101" pitchFamily="49" charset="-122"/>
+                    <a:cs typeface="Arial" panose="020B0604020202020204" pitchFamily="34" charset="0"/>
+                  </a:rPr>
+                  <a:t>dropout</a:t>
+                </a:r>
+                <a:r>
+                  <a:rPr lang="zh-CN" altLang="en-US" sz="800" dirty="0">
+                    <a:latin typeface="Arial" panose="020B0604020202020204" pitchFamily="34" charset="0"/>
+                    <a:ea typeface="楷体" panose="02010609060101010101" pitchFamily="49" charset="-122"/>
+                    <a:cs typeface="Arial" panose="020B0604020202020204" pitchFamily="34" charset="0"/>
+                  </a:rPr>
+                  <a:t> </a:t>
+                </a:r>
+                <a:r>
+                  <a:rPr lang="en-US" altLang="zh-CN" sz="800" dirty="0">
+                    <a:latin typeface="Arial" panose="020B0604020202020204" pitchFamily="34" charset="0"/>
+                    <a:ea typeface="楷体" panose="02010609060101010101" pitchFamily="49" charset="-122"/>
+                    <a:cs typeface="Arial" panose="020B0604020202020204" pitchFamily="34" charset="0"/>
+                  </a:rPr>
+                  <a:t>rate</a:t>
+                </a:r>
+              </a:p>
+            </p:txBody>
+          </p:sp>
+        </mc:Choice>
+        <mc:Fallback xmlns="">
+          <p:sp>
+            <p:nvSpPr>
+              <p:cNvPr id="2" name="文本框 33">
+                <a:extLst>
+                  <a:ext uri="{FF2B5EF4-FFF2-40B4-BE49-F238E27FC236}">
+                    <a16:creationId xmlns:a16="http://schemas.microsoft.com/office/drawing/2014/main" id="{F44533B4-D453-626F-D8E4-D63BC925CD78}"/>
+                  </a:ext>
+                </a:extLst>
+              </p:cNvPr>
+              <p:cNvSpPr txBox="1">
+                <a:spLocks noRot="1" noChangeAspect="1" noMove="1" noResize="1" noEditPoints="1" noAdjustHandles="1" noChangeArrowheads="1" noChangeShapeType="1" noTextEdit="1"/>
+              </p:cNvSpPr>
+              <p:nvPr/>
+            </p:nvSpPr>
+            <p:spPr>
+              <a:xfrm>
+                <a:off x="4584727" y="4070955"/>
+                <a:ext cx="1247481" cy="584775"/>
+              </a:xfrm>
+              <a:prstGeom prst="rect">
+                <a:avLst/>
+              </a:prstGeom>
+              <a:blipFill>
+                <a:blip r:embed="rId16"/>
+                <a:stretch>
+                  <a:fillRect b="-2083"/>
+                </a:stretch>
+              </a:blipFill>
+              <a:ln w="9525"/>
+            </p:spPr>
+            <p:txBody>
+              <a:bodyPr/>
+              <a:lstStyle/>
+              <a:p>
+                <a:r>
+                  <a:rPr lang="en-US">
+                    <a:noFill/>
+                  </a:rPr>
+                  <a:t> </a:t>
+                </a:r>
+              </a:p>
+            </p:txBody>
+          </p:sp>
+        </mc:Fallback>
+      </mc:AlternateContent>
       <p:pic>
         <p:nvPicPr>
-          <p:cNvPr id="110" name="Picture 109">
+          <p:cNvPr id="112" name="Picture 111">
             <a:extLst>
               <a:ext uri="{FF2B5EF4-FFF2-40B4-BE49-F238E27FC236}">
-                <a16:creationId xmlns:a16="http://schemas.microsoft.com/office/drawing/2014/main" id="{97B5C34E-FE74-4D9B-8FBC-93F40CB45B49}"/>
+                <a16:creationId xmlns:a16="http://schemas.microsoft.com/office/drawing/2014/main" id="{EFFBF5A3-F295-301C-423D-9BB48D2E676D}"/>
               </a:ext>
             </a:extLst>
           </p:cNvPr>
@@ -15030,15 +15514,15 @@
           <p:nvPr/>
         </p:nvPicPr>
         <p:blipFill>
-          <a:blip r:embed="rId16"/>
+          <a:blip r:embed="rId17"/>
           <a:stretch>
             <a:fillRect/>
           </a:stretch>
         </p:blipFill>
         <p:spPr>
           <a:xfrm>
-            <a:off x="503303" y="4858083"/>
-            <a:ext cx="5511800" cy="2654300"/>
+            <a:off x="638599" y="5245115"/>
+            <a:ext cx="5511800" cy="2667000"/>
           </a:xfrm>
           <a:prstGeom prst="rect">
             <a:avLst/>

</xml_diff>